<commit_message>
starting to reject bad trials by behavioral data
starting to reject bad trials by behavioral data
</commit_message>
<xml_diff>
--- a/overview_preprocessing_pipeline.pptx
+++ b/overview_preprocessing_pipeline.pptx
@@ -6,6 +6,7 @@
   </p:sldMasterIdLst>
   <p:sldIdLst>
     <p:sldId id="256" r:id="rId2"/>
+    <p:sldId id="257" r:id="rId3"/>
   </p:sldIdLst>
   <p:sldSz cx="6858000" cy="9906000" type="A4"/>
   <p:notesSz cx="6858000" cy="9144000"/>
@@ -104,7 +105,44 @@
       </a:defRPr>
     </a:lvl9pPr>
   </p:defaultTextStyle>
+  <p:extLst>
+    <p:ext uri="{EFAFB233-063F-42B5-8137-9DF3F51BA10A}">
+      <p15:sldGuideLst xmlns:p15="http://schemas.microsoft.com/office/powerpoint/2012/main"/>
+    </p:ext>
+  </p:extLst>
 </p:presentation>
+</file>
+
+<file path=ppt/authors.xml><?xml version="1.0" encoding="utf-8"?>
+<p188:authorLst xmlns:a="http://schemas.openxmlformats.org/drawingml/2006/main" xmlns:r="http://schemas.openxmlformats.org/officeDocument/2006/relationships" xmlns:p188="http://schemas.microsoft.com/office/powerpoint/2018/8/main">
+  <p188:author id="{35FCD466-44A2-5C85-E4C1-555A880C4653}" name="Wilken, Saskia" initials="WS" userId="Wilken, Saskia" providerId="None"/>
+</p188:authorLst>
+</file>
+
+<file path=ppt/comments/modernComment_101_2589D3CA.xml><?xml version="1.0" encoding="utf-8"?>
+<p188:cmLst xmlns:a="http://schemas.openxmlformats.org/drawingml/2006/main" xmlns:r="http://schemas.openxmlformats.org/officeDocument/2006/relationships" xmlns:p188="http://schemas.microsoft.com/office/powerpoint/2018/8/main">
+  <p188:cm id="{17698A90-8E50-416F-A205-FB0F33ED691C}" authorId="{35FCD466-44A2-5C85-E4C1-555A880C4653}" created="2022-07-06T14:50:17.438">
+    <ac:txMkLst xmlns:ac="http://schemas.microsoft.com/office/drawing/2013/main/command">
+      <pc:docMk xmlns:pc="http://schemas.microsoft.com/office/powerpoint/2013/main/command"/>
+      <pc:sldMk xmlns:pc="http://schemas.microsoft.com/office/powerpoint/2013/main/command" cId="629789642" sldId="257"/>
+      <ac:spMk id="17" creationId="{080698A1-7520-D1E7-8D74-44AE25DBD027}"/>
+      <ac:txMk cp="59" len="18">
+        <ac:context len="256" hash="2477001803"/>
+      </ac:txMk>
+    </ac:txMkLst>
+    <p188:pos x="1266988" y="670145"/>
+    <p188:txBody>
+      <a:bodyPr/>
+      <a:lstStyle/>
+      <a:p>
+        <a:r>
+          <a:rPr lang="de-DE"/>
+          <a:t>Anderer Name</a:t>
+        </a:r>
+      </a:p>
+    </p188:txBody>
+  </p188:cm>
+</p188:cmLst>
 </file>
 
 <file path=ppt/slideLayouts/slideLayout1.xml><?xml version="1.0" encoding="utf-8"?>
@@ -149,7 +187,7 @@
           </a:lstStyle>
           <a:p>
             <a:r>
-              <a:rPr lang="de-DE" smtClean="0"/>
+              <a:rPr lang="de-DE"/>
               <a:t>Titelmasterformat durch Klicken bearbeiten</a:t>
             </a:r>
             <a:endParaRPr lang="en-US" dirty="0"/>
@@ -214,7 +252,7 @@
           </a:lstStyle>
           <a:p>
             <a:r>
-              <a:rPr lang="de-DE" smtClean="0"/>
+              <a:rPr lang="de-DE"/>
               <a:t>Formatvorlage des Untertitelmasters durch Klicken bearbeiten</a:t>
             </a:r>
             <a:endParaRPr lang="en-US" dirty="0"/>
@@ -238,7 +276,7 @@
           <a:p>
             <a:fld id="{105AF54F-CF0E-482D-9B2B-175791310C05}" type="datetimeFigureOut">
               <a:rPr lang="de-DE" smtClean="0"/>
-              <a:t>29.06.2022</a:t>
+              <a:t>06.07.2022</a:t>
             </a:fld>
             <a:endParaRPr lang="de-DE"/>
           </a:p>
@@ -332,7 +370,7 @@
           <a:lstStyle/>
           <a:p>
             <a:r>
-              <a:rPr lang="de-DE" smtClean="0"/>
+              <a:rPr lang="de-DE"/>
               <a:t>Titelmasterformat durch Klicken bearbeiten</a:t>
             </a:r>
             <a:endParaRPr lang="en-US" dirty="0"/>
@@ -356,35 +394,35 @@
           <a:p>
             <a:pPr lvl="0"/>
             <a:r>
-              <a:rPr lang="de-DE" smtClean="0"/>
+              <a:rPr lang="de-DE"/>
               <a:t>Formatvorlagen des Textmasters bearbeiten</a:t>
             </a:r>
           </a:p>
           <a:p>
             <a:pPr lvl="1"/>
             <a:r>
-              <a:rPr lang="de-DE" smtClean="0"/>
+              <a:rPr lang="de-DE"/>
               <a:t>Zweite Ebene</a:t>
             </a:r>
           </a:p>
           <a:p>
             <a:pPr lvl="2"/>
             <a:r>
-              <a:rPr lang="de-DE" smtClean="0"/>
+              <a:rPr lang="de-DE"/>
               <a:t>Dritte Ebene</a:t>
             </a:r>
           </a:p>
           <a:p>
             <a:pPr lvl="3"/>
             <a:r>
-              <a:rPr lang="de-DE" smtClean="0"/>
+              <a:rPr lang="de-DE"/>
               <a:t>Vierte Ebene</a:t>
             </a:r>
           </a:p>
           <a:p>
             <a:pPr lvl="4"/>
             <a:r>
-              <a:rPr lang="de-DE" smtClean="0"/>
+              <a:rPr lang="de-DE"/>
               <a:t>Fünfte Ebene</a:t>
             </a:r>
             <a:endParaRPr lang="en-US" dirty="0"/>
@@ -408,7 +446,7 @@
           <a:p>
             <a:fld id="{105AF54F-CF0E-482D-9B2B-175791310C05}" type="datetimeFigureOut">
               <a:rPr lang="de-DE" smtClean="0"/>
-              <a:t>29.06.2022</a:t>
+              <a:t>06.07.2022</a:t>
             </a:fld>
             <a:endParaRPr lang="de-DE"/>
           </a:p>
@@ -507,7 +545,7 @@
           <a:lstStyle/>
           <a:p>
             <a:r>
-              <a:rPr lang="de-DE" smtClean="0"/>
+              <a:rPr lang="de-DE"/>
               <a:t>Titelmasterformat durch Klicken bearbeiten</a:t>
             </a:r>
             <a:endParaRPr lang="en-US" dirty="0"/>
@@ -536,35 +574,35 @@
           <a:p>
             <a:pPr lvl="0"/>
             <a:r>
-              <a:rPr lang="de-DE" smtClean="0"/>
+              <a:rPr lang="de-DE"/>
               <a:t>Formatvorlagen des Textmasters bearbeiten</a:t>
             </a:r>
           </a:p>
           <a:p>
             <a:pPr lvl="1"/>
             <a:r>
-              <a:rPr lang="de-DE" smtClean="0"/>
+              <a:rPr lang="de-DE"/>
               <a:t>Zweite Ebene</a:t>
             </a:r>
           </a:p>
           <a:p>
             <a:pPr lvl="2"/>
             <a:r>
-              <a:rPr lang="de-DE" smtClean="0"/>
+              <a:rPr lang="de-DE"/>
               <a:t>Dritte Ebene</a:t>
             </a:r>
           </a:p>
           <a:p>
             <a:pPr lvl="3"/>
             <a:r>
-              <a:rPr lang="de-DE" smtClean="0"/>
+              <a:rPr lang="de-DE"/>
               <a:t>Vierte Ebene</a:t>
             </a:r>
           </a:p>
           <a:p>
             <a:pPr lvl="4"/>
             <a:r>
-              <a:rPr lang="de-DE" smtClean="0"/>
+              <a:rPr lang="de-DE"/>
               <a:t>Fünfte Ebene</a:t>
             </a:r>
             <a:endParaRPr lang="en-US" dirty="0"/>
@@ -588,7 +626,7 @@
           <a:p>
             <a:fld id="{105AF54F-CF0E-482D-9B2B-175791310C05}" type="datetimeFigureOut">
               <a:rPr lang="de-DE" smtClean="0"/>
-              <a:t>29.06.2022</a:t>
+              <a:t>06.07.2022</a:t>
             </a:fld>
             <a:endParaRPr lang="de-DE"/>
           </a:p>
@@ -682,7 +720,7 @@
           <a:lstStyle/>
           <a:p>
             <a:r>
-              <a:rPr lang="de-DE" smtClean="0"/>
+              <a:rPr lang="de-DE"/>
               <a:t>Titelmasterformat durch Klicken bearbeiten</a:t>
             </a:r>
             <a:endParaRPr lang="en-US" dirty="0"/>
@@ -706,35 +744,35 @@
           <a:p>
             <a:pPr lvl="0"/>
             <a:r>
-              <a:rPr lang="de-DE" smtClean="0"/>
+              <a:rPr lang="de-DE"/>
               <a:t>Formatvorlagen des Textmasters bearbeiten</a:t>
             </a:r>
           </a:p>
           <a:p>
             <a:pPr lvl="1"/>
             <a:r>
-              <a:rPr lang="de-DE" smtClean="0"/>
+              <a:rPr lang="de-DE"/>
               <a:t>Zweite Ebene</a:t>
             </a:r>
           </a:p>
           <a:p>
             <a:pPr lvl="2"/>
             <a:r>
-              <a:rPr lang="de-DE" smtClean="0"/>
+              <a:rPr lang="de-DE"/>
               <a:t>Dritte Ebene</a:t>
             </a:r>
           </a:p>
           <a:p>
             <a:pPr lvl="3"/>
             <a:r>
-              <a:rPr lang="de-DE" smtClean="0"/>
+              <a:rPr lang="de-DE"/>
               <a:t>Vierte Ebene</a:t>
             </a:r>
           </a:p>
           <a:p>
             <a:pPr lvl="4"/>
             <a:r>
-              <a:rPr lang="de-DE" smtClean="0"/>
+              <a:rPr lang="de-DE"/>
               <a:t>Fünfte Ebene</a:t>
             </a:r>
             <a:endParaRPr lang="en-US" dirty="0"/>
@@ -758,7 +796,7 @@
           <a:p>
             <a:fld id="{105AF54F-CF0E-482D-9B2B-175791310C05}" type="datetimeFigureOut">
               <a:rPr lang="de-DE" smtClean="0"/>
-              <a:t>29.06.2022</a:t>
+              <a:t>06.07.2022</a:t>
             </a:fld>
             <a:endParaRPr lang="de-DE"/>
           </a:p>
@@ -861,7 +899,7 @@
           </a:lstStyle>
           <a:p>
             <a:r>
-              <a:rPr lang="de-DE" smtClean="0"/>
+              <a:rPr lang="de-DE"/>
               <a:t>Titelmasterformat durch Klicken bearbeiten</a:t>
             </a:r>
             <a:endParaRPr lang="en-US" dirty="0"/>
@@ -979,7 +1017,7 @@
           <a:p>
             <a:pPr lvl="0"/>
             <a:r>
-              <a:rPr lang="de-DE" smtClean="0"/>
+              <a:rPr lang="de-DE"/>
               <a:t>Formatvorlagen des Textmasters bearbeiten</a:t>
             </a:r>
           </a:p>
@@ -1002,7 +1040,7 @@
           <a:p>
             <a:fld id="{105AF54F-CF0E-482D-9B2B-175791310C05}" type="datetimeFigureOut">
               <a:rPr lang="de-DE" smtClean="0"/>
-              <a:t>29.06.2022</a:t>
+              <a:t>06.07.2022</a:t>
             </a:fld>
             <a:endParaRPr lang="de-DE"/>
           </a:p>
@@ -1096,7 +1134,7 @@
           <a:lstStyle/>
           <a:p>
             <a:r>
-              <a:rPr lang="de-DE" smtClean="0"/>
+              <a:rPr lang="de-DE"/>
               <a:t>Titelmasterformat durch Klicken bearbeiten</a:t>
             </a:r>
             <a:endParaRPr lang="en-US" dirty="0"/>
@@ -1125,35 +1163,35 @@
           <a:p>
             <a:pPr lvl="0"/>
             <a:r>
-              <a:rPr lang="de-DE" smtClean="0"/>
+              <a:rPr lang="de-DE"/>
               <a:t>Formatvorlagen des Textmasters bearbeiten</a:t>
             </a:r>
           </a:p>
           <a:p>
             <a:pPr lvl="1"/>
             <a:r>
-              <a:rPr lang="de-DE" smtClean="0"/>
+              <a:rPr lang="de-DE"/>
               <a:t>Zweite Ebene</a:t>
             </a:r>
           </a:p>
           <a:p>
             <a:pPr lvl="2"/>
             <a:r>
-              <a:rPr lang="de-DE" smtClean="0"/>
+              <a:rPr lang="de-DE"/>
               <a:t>Dritte Ebene</a:t>
             </a:r>
           </a:p>
           <a:p>
             <a:pPr lvl="3"/>
             <a:r>
-              <a:rPr lang="de-DE" smtClean="0"/>
+              <a:rPr lang="de-DE"/>
               <a:t>Vierte Ebene</a:t>
             </a:r>
           </a:p>
           <a:p>
             <a:pPr lvl="4"/>
             <a:r>
-              <a:rPr lang="de-DE" smtClean="0"/>
+              <a:rPr lang="de-DE"/>
               <a:t>Fünfte Ebene</a:t>
             </a:r>
             <a:endParaRPr lang="en-US" dirty="0"/>
@@ -1182,35 +1220,35 @@
           <a:p>
             <a:pPr lvl="0"/>
             <a:r>
-              <a:rPr lang="de-DE" smtClean="0"/>
+              <a:rPr lang="de-DE"/>
               <a:t>Formatvorlagen des Textmasters bearbeiten</a:t>
             </a:r>
           </a:p>
           <a:p>
             <a:pPr lvl="1"/>
             <a:r>
-              <a:rPr lang="de-DE" smtClean="0"/>
+              <a:rPr lang="de-DE"/>
               <a:t>Zweite Ebene</a:t>
             </a:r>
           </a:p>
           <a:p>
             <a:pPr lvl="2"/>
             <a:r>
-              <a:rPr lang="de-DE" smtClean="0"/>
+              <a:rPr lang="de-DE"/>
               <a:t>Dritte Ebene</a:t>
             </a:r>
           </a:p>
           <a:p>
             <a:pPr lvl="3"/>
             <a:r>
-              <a:rPr lang="de-DE" smtClean="0"/>
+              <a:rPr lang="de-DE"/>
               <a:t>Vierte Ebene</a:t>
             </a:r>
           </a:p>
           <a:p>
             <a:pPr lvl="4"/>
             <a:r>
-              <a:rPr lang="de-DE" smtClean="0"/>
+              <a:rPr lang="de-DE"/>
               <a:t>Fünfte Ebene</a:t>
             </a:r>
             <a:endParaRPr lang="en-US" dirty="0"/>
@@ -1234,7 +1272,7 @@
           <a:p>
             <a:fld id="{105AF54F-CF0E-482D-9B2B-175791310C05}" type="datetimeFigureOut">
               <a:rPr lang="de-DE" smtClean="0"/>
-              <a:t>29.06.2022</a:t>
+              <a:t>06.07.2022</a:t>
             </a:fld>
             <a:endParaRPr lang="de-DE"/>
           </a:p>
@@ -1333,7 +1371,7 @@
           <a:lstStyle/>
           <a:p>
             <a:r>
-              <a:rPr lang="de-DE" smtClean="0"/>
+              <a:rPr lang="de-DE"/>
               <a:t>Titelmasterformat durch Klicken bearbeiten</a:t>
             </a:r>
             <a:endParaRPr lang="en-US" dirty="0"/>
@@ -1399,7 +1437,7 @@
           <a:p>
             <a:pPr lvl="0"/>
             <a:r>
-              <a:rPr lang="de-DE" smtClean="0"/>
+              <a:rPr lang="de-DE"/>
               <a:t>Formatvorlagen des Textmasters bearbeiten</a:t>
             </a:r>
           </a:p>
@@ -1427,35 +1465,35 @@
           <a:p>
             <a:pPr lvl="0"/>
             <a:r>
-              <a:rPr lang="de-DE" smtClean="0"/>
+              <a:rPr lang="de-DE"/>
               <a:t>Formatvorlagen des Textmasters bearbeiten</a:t>
             </a:r>
           </a:p>
           <a:p>
             <a:pPr lvl="1"/>
             <a:r>
-              <a:rPr lang="de-DE" smtClean="0"/>
+              <a:rPr lang="de-DE"/>
               <a:t>Zweite Ebene</a:t>
             </a:r>
           </a:p>
           <a:p>
             <a:pPr lvl="2"/>
             <a:r>
-              <a:rPr lang="de-DE" smtClean="0"/>
+              <a:rPr lang="de-DE"/>
               <a:t>Dritte Ebene</a:t>
             </a:r>
           </a:p>
           <a:p>
             <a:pPr lvl="3"/>
             <a:r>
-              <a:rPr lang="de-DE" smtClean="0"/>
+              <a:rPr lang="de-DE"/>
               <a:t>Vierte Ebene</a:t>
             </a:r>
           </a:p>
           <a:p>
             <a:pPr lvl="4"/>
             <a:r>
-              <a:rPr lang="de-DE" smtClean="0"/>
+              <a:rPr lang="de-DE"/>
               <a:t>Fünfte Ebene</a:t>
             </a:r>
             <a:endParaRPr lang="en-US" dirty="0"/>
@@ -1521,7 +1559,7 @@
           <a:p>
             <a:pPr lvl="0"/>
             <a:r>
-              <a:rPr lang="de-DE" smtClean="0"/>
+              <a:rPr lang="de-DE"/>
               <a:t>Formatvorlagen des Textmasters bearbeiten</a:t>
             </a:r>
           </a:p>
@@ -1549,35 +1587,35 @@
           <a:p>
             <a:pPr lvl="0"/>
             <a:r>
-              <a:rPr lang="de-DE" smtClean="0"/>
+              <a:rPr lang="de-DE"/>
               <a:t>Formatvorlagen des Textmasters bearbeiten</a:t>
             </a:r>
           </a:p>
           <a:p>
             <a:pPr lvl="1"/>
             <a:r>
-              <a:rPr lang="de-DE" smtClean="0"/>
+              <a:rPr lang="de-DE"/>
               <a:t>Zweite Ebene</a:t>
             </a:r>
           </a:p>
           <a:p>
             <a:pPr lvl="2"/>
             <a:r>
-              <a:rPr lang="de-DE" smtClean="0"/>
+              <a:rPr lang="de-DE"/>
               <a:t>Dritte Ebene</a:t>
             </a:r>
           </a:p>
           <a:p>
             <a:pPr lvl="3"/>
             <a:r>
-              <a:rPr lang="de-DE" smtClean="0"/>
+              <a:rPr lang="de-DE"/>
               <a:t>Vierte Ebene</a:t>
             </a:r>
           </a:p>
           <a:p>
             <a:pPr lvl="4"/>
             <a:r>
-              <a:rPr lang="de-DE" smtClean="0"/>
+              <a:rPr lang="de-DE"/>
               <a:t>Fünfte Ebene</a:t>
             </a:r>
             <a:endParaRPr lang="en-US" dirty="0"/>
@@ -1601,7 +1639,7 @@
           <a:p>
             <a:fld id="{105AF54F-CF0E-482D-9B2B-175791310C05}" type="datetimeFigureOut">
               <a:rPr lang="de-DE" smtClean="0"/>
-              <a:t>29.06.2022</a:t>
+              <a:t>06.07.2022</a:t>
             </a:fld>
             <a:endParaRPr lang="de-DE"/>
           </a:p>
@@ -1695,7 +1733,7 @@
           <a:lstStyle/>
           <a:p>
             <a:r>
-              <a:rPr lang="de-DE" smtClean="0"/>
+              <a:rPr lang="de-DE"/>
               <a:t>Titelmasterformat durch Klicken bearbeiten</a:t>
             </a:r>
             <a:endParaRPr lang="en-US" dirty="0"/>
@@ -1719,7 +1757,7 @@
           <a:p>
             <a:fld id="{105AF54F-CF0E-482D-9B2B-175791310C05}" type="datetimeFigureOut">
               <a:rPr lang="de-DE" smtClean="0"/>
-              <a:t>29.06.2022</a:t>
+              <a:t>06.07.2022</a:t>
             </a:fld>
             <a:endParaRPr lang="de-DE"/>
           </a:p>
@@ -1814,7 +1852,7 @@
           <a:p>
             <a:fld id="{105AF54F-CF0E-482D-9B2B-175791310C05}" type="datetimeFigureOut">
               <a:rPr lang="de-DE" smtClean="0"/>
-              <a:t>29.06.2022</a:t>
+              <a:t>06.07.2022</a:t>
             </a:fld>
             <a:endParaRPr lang="de-DE"/>
           </a:p>
@@ -1917,7 +1955,7 @@
           </a:lstStyle>
           <a:p>
             <a:r>
-              <a:rPr lang="de-DE" smtClean="0"/>
+              <a:rPr lang="de-DE"/>
               <a:t>Titelmasterformat durch Klicken bearbeiten</a:t>
             </a:r>
             <a:endParaRPr lang="en-US" dirty="0"/>
@@ -1974,35 +2012,35 @@
           <a:p>
             <a:pPr lvl="0"/>
             <a:r>
-              <a:rPr lang="de-DE" smtClean="0"/>
+              <a:rPr lang="de-DE"/>
               <a:t>Formatvorlagen des Textmasters bearbeiten</a:t>
             </a:r>
           </a:p>
           <a:p>
             <a:pPr lvl="1"/>
             <a:r>
-              <a:rPr lang="de-DE" smtClean="0"/>
+              <a:rPr lang="de-DE"/>
               <a:t>Zweite Ebene</a:t>
             </a:r>
           </a:p>
           <a:p>
             <a:pPr lvl="2"/>
             <a:r>
-              <a:rPr lang="de-DE" smtClean="0"/>
+              <a:rPr lang="de-DE"/>
               <a:t>Dritte Ebene</a:t>
             </a:r>
           </a:p>
           <a:p>
             <a:pPr lvl="3"/>
             <a:r>
-              <a:rPr lang="de-DE" smtClean="0"/>
+              <a:rPr lang="de-DE"/>
               <a:t>Vierte Ebene</a:t>
             </a:r>
           </a:p>
           <a:p>
             <a:pPr lvl="4"/>
             <a:r>
-              <a:rPr lang="de-DE" smtClean="0"/>
+              <a:rPr lang="de-DE"/>
               <a:t>Fünfte Ebene</a:t>
             </a:r>
             <a:endParaRPr lang="en-US" dirty="0"/>
@@ -2068,7 +2106,7 @@
           <a:p>
             <a:pPr lvl="0"/>
             <a:r>
-              <a:rPr lang="de-DE" smtClean="0"/>
+              <a:rPr lang="de-DE"/>
               <a:t>Formatvorlagen des Textmasters bearbeiten</a:t>
             </a:r>
           </a:p>
@@ -2091,7 +2129,7 @@
           <a:p>
             <a:fld id="{105AF54F-CF0E-482D-9B2B-175791310C05}" type="datetimeFigureOut">
               <a:rPr lang="de-DE" smtClean="0"/>
-              <a:t>29.06.2022</a:t>
+              <a:t>06.07.2022</a:t>
             </a:fld>
             <a:endParaRPr lang="de-DE"/>
           </a:p>
@@ -2194,7 +2232,7 @@
           </a:lstStyle>
           <a:p>
             <a:r>
-              <a:rPr lang="de-DE" smtClean="0"/>
+              <a:rPr lang="de-DE"/>
               <a:t>Titelmasterformat durch Klicken bearbeiten</a:t>
             </a:r>
             <a:endParaRPr lang="en-US" dirty="0"/>
@@ -2259,7 +2297,7 @@
           </a:lstStyle>
           <a:p>
             <a:r>
-              <a:rPr lang="de-DE" smtClean="0"/>
+              <a:rPr lang="de-DE"/>
               <a:t>Bild durch Klicken auf Symbol hinzufügen</a:t>
             </a:r>
             <a:endParaRPr lang="en-US" dirty="0"/>
@@ -2325,7 +2363,7 @@
           <a:p>
             <a:pPr lvl="0"/>
             <a:r>
-              <a:rPr lang="de-DE" smtClean="0"/>
+              <a:rPr lang="de-DE"/>
               <a:t>Formatvorlagen des Textmasters bearbeiten</a:t>
             </a:r>
           </a:p>
@@ -2348,7 +2386,7 @@
           <a:p>
             <a:fld id="{105AF54F-CF0E-482D-9B2B-175791310C05}" type="datetimeFigureOut">
               <a:rPr lang="de-DE" smtClean="0"/>
-              <a:t>29.06.2022</a:t>
+              <a:t>06.07.2022</a:t>
             </a:fld>
             <a:endParaRPr lang="de-DE"/>
           </a:p>
@@ -2457,7 +2495,7 @@
           <a:lstStyle/>
           <a:p>
             <a:r>
-              <a:rPr lang="de-DE" smtClean="0"/>
+              <a:rPr lang="de-DE"/>
               <a:t>Titelmasterformat durch Klicken bearbeiten</a:t>
             </a:r>
             <a:endParaRPr lang="en-US" dirty="0"/>
@@ -2491,35 +2529,35 @@
           <a:p>
             <a:pPr lvl="0"/>
             <a:r>
-              <a:rPr lang="de-DE" smtClean="0"/>
+              <a:rPr lang="de-DE"/>
               <a:t>Formatvorlagen des Textmasters bearbeiten</a:t>
             </a:r>
           </a:p>
           <a:p>
             <a:pPr lvl="1"/>
             <a:r>
-              <a:rPr lang="de-DE" smtClean="0"/>
+              <a:rPr lang="de-DE"/>
               <a:t>Zweite Ebene</a:t>
             </a:r>
           </a:p>
           <a:p>
             <a:pPr lvl="2"/>
             <a:r>
-              <a:rPr lang="de-DE" smtClean="0"/>
+              <a:rPr lang="de-DE"/>
               <a:t>Dritte Ebene</a:t>
             </a:r>
           </a:p>
           <a:p>
             <a:pPr lvl="3"/>
             <a:r>
-              <a:rPr lang="de-DE" smtClean="0"/>
+              <a:rPr lang="de-DE"/>
               <a:t>Vierte Ebene</a:t>
             </a:r>
           </a:p>
           <a:p>
             <a:pPr lvl="4"/>
             <a:r>
-              <a:rPr lang="de-DE" smtClean="0"/>
+              <a:rPr lang="de-DE"/>
               <a:t>Fünfte Ebene</a:t>
             </a:r>
             <a:endParaRPr lang="en-US" dirty="0"/>
@@ -2561,7 +2599,7 @@
           <a:p>
             <a:fld id="{105AF54F-CF0E-482D-9B2B-175791310C05}" type="datetimeFigureOut">
               <a:rPr lang="de-DE" smtClean="0"/>
-              <a:t>29.06.2022</a:t>
+              <a:t>06.07.2022</a:t>
             </a:fld>
             <a:endParaRPr lang="de-DE"/>
           </a:p>
@@ -3087,10 +3125,9 @@
           <a:lstStyle/>
           <a:p>
             <a:r>
-              <a:rPr lang="de-DE" dirty="0" smtClean="0"/>
+              <a:rPr lang="de-DE" dirty="0"/>
               <a:t>Task A</a:t>
             </a:r>
-            <a:endParaRPr lang="de-DE" dirty="0"/>
           </a:p>
         </p:txBody>
       </p:sp>
@@ -3117,10 +3154,9 @@
           <a:lstStyle/>
           <a:p>
             <a:r>
-              <a:rPr lang="de-DE" dirty="0" smtClean="0"/>
+              <a:rPr lang="de-DE" dirty="0"/>
               <a:t>Task B</a:t>
             </a:r>
-            <a:endParaRPr lang="de-DE" dirty="0"/>
           </a:p>
         </p:txBody>
       </p:sp>
@@ -3161,120 +3197,119 @@
           <a:lstStyle/>
           <a:p>
             <a:r>
-              <a:rPr lang="de-DE" sz="1100" b="1" i="1" dirty="0" err="1" smtClean="0"/>
-              <a:t>tracking_A_readdata_preprocessing_new.m</a:t>
-            </a:r>
-            <a:endParaRPr lang="de-DE" sz="1100" b="1" i="1" dirty="0" smtClean="0"/>
-          </a:p>
-          <a:p>
-            <a:r>
-              <a:rPr lang="de-DE" sz="1100" dirty="0" smtClean="0"/>
+              <a:rPr lang="de-DE" sz="1100" b="1" i="1" dirty="0"/>
+              <a:t>tracking_1_readdata_preprocessing_new.m</a:t>
+            </a:r>
+          </a:p>
+          <a:p>
+            <a:r>
+              <a:rPr lang="de-DE" sz="1100" dirty="0"/>
               <a:t>Read </a:t>
             </a:r>
             <a:r>
-              <a:rPr lang="de-DE" sz="1100" dirty="0" err="1" smtClean="0"/>
+              <a:rPr lang="de-DE" sz="1100" dirty="0" err="1"/>
               <a:t>raw</a:t>
             </a:r>
             <a:r>
-              <a:rPr lang="de-DE" sz="1100" dirty="0" smtClean="0"/>
+              <a:rPr lang="de-DE" sz="1100" dirty="0"/>
               <a:t> EEG </a:t>
             </a:r>
             <a:r>
-              <a:rPr lang="de-DE" sz="1100" dirty="0" err="1" smtClean="0"/>
+              <a:rPr lang="de-DE" sz="1100" dirty="0" err="1"/>
               <a:t>data</a:t>
             </a:r>
             <a:r>
-              <a:rPr lang="de-DE" sz="1100" dirty="0" smtClean="0"/>
+              <a:rPr lang="de-DE" sz="1100" dirty="0"/>
               <a:t>, </a:t>
             </a:r>
             <a:r>
-              <a:rPr lang="de-DE" sz="1100" dirty="0" err="1" smtClean="0"/>
+              <a:rPr lang="de-DE" sz="1100" dirty="0" err="1"/>
               <a:t>first</a:t>
             </a:r>
             <a:r>
-              <a:rPr lang="de-DE" sz="1100" dirty="0" smtClean="0"/>
-              <a:t> </a:t>
-            </a:r>
-            <a:r>
-              <a:rPr lang="de-DE" sz="1100" dirty="0" err="1" smtClean="0"/>
+              <a:rPr lang="de-DE" sz="1100" dirty="0"/>
+              <a:t> </a:t>
+            </a:r>
+            <a:r>
+              <a:rPr lang="de-DE" sz="1100" dirty="0" err="1"/>
               <a:t>preprocessing</a:t>
             </a:r>
             <a:r>
-              <a:rPr lang="de-DE" sz="1100" dirty="0" smtClean="0"/>
-              <a:t> </a:t>
-            </a:r>
-            <a:r>
-              <a:rPr lang="de-DE" sz="1100" dirty="0" err="1" smtClean="0"/>
+              <a:rPr lang="de-DE" sz="1100" dirty="0"/>
+              <a:t> </a:t>
+            </a:r>
+            <a:r>
+              <a:rPr lang="de-DE" sz="1100" dirty="0" err="1"/>
               <a:t>steps</a:t>
             </a:r>
             <a:r>
-              <a:rPr lang="de-DE" sz="1100" dirty="0" smtClean="0"/>
+              <a:rPr lang="de-DE" sz="1100" dirty="0"/>
               <a:t> (</a:t>
             </a:r>
             <a:r>
-              <a:rPr lang="de-DE" sz="1100" dirty="0" err="1" smtClean="0"/>
+              <a:rPr lang="de-DE" sz="1100" dirty="0" err="1"/>
               <a:t>filters</a:t>
             </a:r>
             <a:r>
-              <a:rPr lang="de-DE" sz="1100" dirty="0" smtClean="0"/>
+              <a:rPr lang="de-DE" sz="1100" dirty="0"/>
               <a:t>, </a:t>
             </a:r>
             <a:r>
-              <a:rPr lang="de-DE" sz="1100" dirty="0" err="1" smtClean="0"/>
+              <a:rPr lang="de-DE" sz="1100" dirty="0" err="1"/>
               <a:t>downsampling</a:t>
             </a:r>
             <a:r>
-              <a:rPr lang="de-DE" sz="1100" dirty="0" smtClean="0"/>
+              <a:rPr lang="de-DE" sz="1100" dirty="0"/>
               <a:t>, </a:t>
             </a:r>
             <a:r>
-              <a:rPr lang="de-DE" sz="1100" dirty="0" err="1" smtClean="0"/>
+              <a:rPr lang="de-DE" sz="1100" dirty="0" err="1"/>
               <a:t>rereferencing</a:t>
             </a:r>
             <a:r>
-              <a:rPr lang="de-DE" sz="1100" dirty="0" smtClean="0"/>
+              <a:rPr lang="de-DE" sz="1100" dirty="0"/>
               <a:t> etc.)</a:t>
             </a:r>
           </a:p>
           <a:p>
             <a:r>
-              <a:rPr lang="de-DE" sz="1100" dirty="0" smtClean="0"/>
+              <a:rPr lang="de-DE" sz="1100" dirty="0"/>
               <a:t>+ </a:t>
             </a:r>
             <a:r>
-              <a:rPr lang="de-DE" sz="1100" dirty="0" err="1" smtClean="0"/>
+              <a:rPr lang="de-DE" sz="1100" dirty="0" err="1"/>
               <a:t>export</a:t>
             </a:r>
             <a:r>
-              <a:rPr lang="de-DE" sz="1100" dirty="0" smtClean="0"/>
+              <a:rPr lang="de-DE" sz="1100" dirty="0"/>
               <a:t> in EEGLAB </a:t>
             </a:r>
             <a:r>
-              <a:rPr lang="de-DE" sz="1100" dirty="0" err="1" smtClean="0"/>
+              <a:rPr lang="de-DE" sz="1100" dirty="0" err="1"/>
               <a:t>structure</a:t>
             </a:r>
             <a:r>
-              <a:rPr lang="de-DE" sz="1100" dirty="0" smtClean="0"/>
-              <a:t> </a:t>
-            </a:r>
-            <a:r>
-              <a:rPr lang="de-DE" sz="1100" dirty="0" err="1" smtClean="0"/>
+              <a:rPr lang="de-DE" sz="1100" dirty="0"/>
+              <a:t> </a:t>
+            </a:r>
+            <a:r>
+              <a:rPr lang="de-DE" sz="1100" dirty="0" err="1"/>
               <a:t>as</a:t>
             </a:r>
             <a:r>
-              <a:rPr lang="de-DE" sz="1100" dirty="0" smtClean="0"/>
-              <a:t> </a:t>
-            </a:r>
-            <a:r>
-              <a:rPr lang="de-DE" sz="1100" dirty="0" err="1" smtClean="0"/>
+              <a:rPr lang="de-DE" sz="1100" dirty="0"/>
+              <a:t> </a:t>
+            </a:r>
+            <a:r>
+              <a:rPr lang="de-DE" sz="1100" dirty="0" err="1"/>
               <a:t>continuous</a:t>
             </a:r>
             <a:r>
-              <a:rPr lang="de-DE" sz="1100" dirty="0" smtClean="0"/>
-              <a:t> </a:t>
-            </a:r>
-            <a:r>
-              <a:rPr lang="de-DE" sz="1100" dirty="0" err="1" smtClean="0"/>
+              <a:rPr lang="de-DE" sz="1100" dirty="0"/>
+              <a:t> </a:t>
+            </a:r>
+            <a:r>
+              <a:rPr lang="de-DE" sz="1100" dirty="0" err="1"/>
               <a:t>data</a:t>
             </a:r>
             <a:endParaRPr lang="de-DE" sz="1100" dirty="0"/>
@@ -3318,100 +3353,99 @@
           <a:lstStyle/>
           <a:p>
             <a:r>
-              <a:rPr lang="de-DE" sz="1100" b="1" i="1" dirty="0" err="1" smtClean="0"/>
-              <a:t>tracking_occlusion_A_readdata_preprocessing_new.m</a:t>
-            </a:r>
-            <a:endParaRPr lang="de-DE" sz="1100" b="1" i="1" dirty="0" smtClean="0"/>
-          </a:p>
-          <a:p>
-            <a:r>
-              <a:rPr lang="de-DE" sz="1100" dirty="0" smtClean="0"/>
+              <a:rPr lang="de-DE" sz="1100" b="1" i="1" dirty="0"/>
+              <a:t>tracking_occlusion_1_readdata_preprocessing_new.m</a:t>
+            </a:r>
+          </a:p>
+          <a:p>
+            <a:r>
+              <a:rPr lang="de-DE" sz="1100" dirty="0"/>
               <a:t>Read </a:t>
             </a:r>
             <a:r>
-              <a:rPr lang="de-DE" sz="1100" dirty="0" err="1" smtClean="0"/>
+              <a:rPr lang="de-DE" sz="1100" dirty="0" err="1"/>
               <a:t>raw</a:t>
             </a:r>
             <a:r>
-              <a:rPr lang="de-DE" sz="1100" dirty="0" smtClean="0"/>
+              <a:rPr lang="de-DE" sz="1100" dirty="0"/>
               <a:t> EEG </a:t>
             </a:r>
             <a:r>
-              <a:rPr lang="de-DE" sz="1100" dirty="0" err="1" smtClean="0"/>
+              <a:rPr lang="de-DE" sz="1100" dirty="0" err="1"/>
               <a:t>data</a:t>
             </a:r>
             <a:r>
-              <a:rPr lang="de-DE" sz="1100" dirty="0" smtClean="0"/>
+              <a:rPr lang="de-DE" sz="1100" dirty="0"/>
               <a:t>, </a:t>
             </a:r>
             <a:r>
-              <a:rPr lang="de-DE" sz="1100" dirty="0" err="1" smtClean="0"/>
+              <a:rPr lang="de-DE" sz="1100" dirty="0" err="1"/>
               <a:t>first</a:t>
             </a:r>
             <a:r>
-              <a:rPr lang="de-DE" sz="1100" dirty="0" smtClean="0"/>
-              <a:t> </a:t>
-            </a:r>
-            <a:r>
-              <a:rPr lang="de-DE" sz="1100" dirty="0" err="1" smtClean="0"/>
+              <a:rPr lang="de-DE" sz="1100" dirty="0"/>
+              <a:t> </a:t>
+            </a:r>
+            <a:r>
+              <a:rPr lang="de-DE" sz="1100" dirty="0" err="1"/>
               <a:t>preprocessing</a:t>
             </a:r>
             <a:r>
-              <a:rPr lang="de-DE" sz="1100" dirty="0" smtClean="0"/>
-              <a:t> </a:t>
-            </a:r>
-            <a:r>
-              <a:rPr lang="de-DE" sz="1100" dirty="0" err="1" smtClean="0"/>
+              <a:rPr lang="de-DE" sz="1100" dirty="0"/>
+              <a:t> </a:t>
+            </a:r>
+            <a:r>
+              <a:rPr lang="de-DE" sz="1100" dirty="0" err="1"/>
               <a:t>steps</a:t>
             </a:r>
             <a:r>
-              <a:rPr lang="de-DE" sz="1100" dirty="0" smtClean="0"/>
+              <a:rPr lang="de-DE" sz="1100" dirty="0"/>
               <a:t> (</a:t>
             </a:r>
             <a:r>
-              <a:rPr lang="de-DE" sz="1100" dirty="0" err="1" smtClean="0"/>
+              <a:rPr lang="de-DE" sz="1100" dirty="0" err="1"/>
               <a:t>filters</a:t>
             </a:r>
             <a:r>
-              <a:rPr lang="de-DE" sz="1100" dirty="0" smtClean="0"/>
+              <a:rPr lang="de-DE" sz="1100" dirty="0"/>
               <a:t>, </a:t>
             </a:r>
             <a:r>
-              <a:rPr lang="de-DE" sz="1100" dirty="0" err="1" smtClean="0"/>
+              <a:rPr lang="de-DE" sz="1100" dirty="0" err="1"/>
               <a:t>downsampling</a:t>
             </a:r>
             <a:r>
-              <a:rPr lang="de-DE" sz="1100" dirty="0" smtClean="0"/>
+              <a:rPr lang="de-DE" sz="1100" dirty="0"/>
               <a:t>, </a:t>
             </a:r>
             <a:r>
-              <a:rPr lang="de-DE" sz="1100" dirty="0" err="1" smtClean="0"/>
+              <a:rPr lang="de-DE" sz="1100" dirty="0" err="1"/>
               <a:t>rereferencing</a:t>
             </a:r>
             <a:r>
-              <a:rPr lang="de-DE" sz="1100" dirty="0" smtClean="0"/>
+              <a:rPr lang="de-DE" sz="1100" dirty="0"/>
               <a:t> etc.)</a:t>
             </a:r>
           </a:p>
           <a:p>
             <a:r>
-              <a:rPr lang="de-DE" sz="1100" dirty="0" smtClean="0"/>
+              <a:rPr lang="de-DE" sz="1100" dirty="0"/>
               <a:t>+ </a:t>
             </a:r>
             <a:r>
-              <a:rPr lang="de-DE" sz="1100" dirty="0" err="1" smtClean="0"/>
+              <a:rPr lang="de-DE" sz="1100" dirty="0" err="1"/>
               <a:t>export</a:t>
             </a:r>
             <a:r>
-              <a:rPr lang="de-DE" sz="1100" dirty="0" smtClean="0"/>
+              <a:rPr lang="de-DE" sz="1100" dirty="0"/>
               <a:t> in EEGLAB </a:t>
             </a:r>
             <a:r>
-              <a:rPr lang="de-DE" sz="1100" dirty="0" err="1" smtClean="0"/>
+              <a:rPr lang="de-DE" sz="1100" dirty="0" err="1"/>
               <a:t>structure</a:t>
             </a:r>
             <a:r>
-              <a:rPr lang="de-DE" sz="1100" dirty="0" smtClean="0"/>
+              <a:rPr lang="de-DE" sz="1100" dirty="0"/>
               <a:t> </a:t>
             </a:r>
             <a:r>
@@ -3475,157 +3509,157 @@
           <a:lstStyle/>
           <a:p>
             <a:r>
-              <a:rPr lang="de-DE" sz="1100" b="1" i="1" dirty="0" smtClean="0"/>
-              <a:t>tracking_B1_combined_ICA.m</a:t>
-            </a:r>
-          </a:p>
-          <a:p>
-            <a:r>
-              <a:rPr lang="de-DE" sz="1100" dirty="0" smtClean="0"/>
+              <a:rPr lang="de-DE" sz="1100" b="1" i="1" dirty="0"/>
+              <a:t>tracking_2_combined_ICA.m</a:t>
+            </a:r>
+          </a:p>
+          <a:p>
+            <a:r>
+              <a:rPr lang="de-DE" sz="1100" dirty="0"/>
               <a:t>Read </a:t>
             </a:r>
             <a:r>
-              <a:rPr lang="de-DE" sz="1100" dirty="0" err="1" smtClean="0"/>
+              <a:rPr lang="de-DE" sz="1100" dirty="0" err="1"/>
               <a:t>preprocessed</a:t>
             </a:r>
             <a:r>
-              <a:rPr lang="de-DE" sz="1100" dirty="0" smtClean="0"/>
+              <a:rPr lang="de-DE" sz="1100" dirty="0"/>
               <a:t> EEGLAB </a:t>
             </a:r>
             <a:r>
-              <a:rPr lang="de-DE" sz="1100" dirty="0" err="1" smtClean="0"/>
+              <a:rPr lang="de-DE" sz="1100" dirty="0" err="1"/>
               <a:t>data</a:t>
             </a:r>
             <a:r>
-              <a:rPr lang="de-DE" sz="1100" dirty="0" smtClean="0"/>
-              <a:t> </a:t>
-            </a:r>
-            <a:r>
-              <a:rPr lang="de-DE" sz="1100" dirty="0" err="1" smtClean="0"/>
+              <a:rPr lang="de-DE" sz="1100" dirty="0"/>
+              <a:t> </a:t>
+            </a:r>
+            <a:r>
+              <a:rPr lang="de-DE" sz="1100" dirty="0" err="1"/>
               <a:t>for</a:t>
             </a:r>
             <a:r>
-              <a:rPr lang="de-DE" sz="1100" dirty="0" smtClean="0"/>
-              <a:t> </a:t>
-            </a:r>
-            <a:r>
-              <a:rPr lang="de-DE" sz="1100" dirty="0" err="1" smtClean="0"/>
+              <a:rPr lang="de-DE" sz="1100" dirty="0"/>
+              <a:t> </a:t>
+            </a:r>
+            <a:r>
+              <a:rPr lang="de-DE" sz="1100" dirty="0" err="1"/>
               <a:t>task</a:t>
             </a:r>
             <a:r>
-              <a:rPr lang="de-DE" sz="1100" dirty="0" smtClean="0"/>
+              <a:rPr lang="de-DE" sz="1100" dirty="0"/>
               <a:t> A </a:t>
             </a:r>
             <a:r>
-              <a:rPr lang="de-DE" sz="1100" dirty="0" err="1" smtClean="0"/>
+              <a:rPr lang="de-DE" sz="1100" dirty="0" err="1"/>
               <a:t>and</a:t>
             </a:r>
             <a:r>
-              <a:rPr lang="de-DE" sz="1100" dirty="0" smtClean="0"/>
+              <a:rPr lang="de-DE" sz="1100" dirty="0"/>
               <a:t> B; </a:t>
             </a:r>
             <a:r>
-              <a:rPr lang="de-DE" sz="1100" dirty="0" err="1" smtClean="0"/>
+              <a:rPr lang="de-DE" sz="1100" dirty="0" err="1"/>
               <a:t>merge</a:t>
             </a:r>
             <a:r>
-              <a:rPr lang="de-DE" sz="1100" dirty="0" smtClean="0"/>
-              <a:t> </a:t>
-            </a:r>
-            <a:r>
-              <a:rPr lang="de-DE" sz="1100" dirty="0" err="1" smtClean="0"/>
+              <a:rPr lang="de-DE" sz="1100" dirty="0"/>
+              <a:t> </a:t>
+            </a:r>
+            <a:r>
+              <a:rPr lang="de-DE" sz="1100" dirty="0" err="1"/>
               <a:t>continuous</a:t>
             </a:r>
             <a:r>
-              <a:rPr lang="de-DE" sz="1100" dirty="0" smtClean="0"/>
-              <a:t> </a:t>
-            </a:r>
-            <a:r>
-              <a:rPr lang="de-DE" sz="1100" dirty="0" err="1" smtClean="0"/>
+              <a:rPr lang="de-DE" sz="1100" dirty="0"/>
+              <a:t> </a:t>
+            </a:r>
+            <a:r>
+              <a:rPr lang="de-DE" sz="1100" dirty="0" err="1"/>
               <a:t>data</a:t>
             </a:r>
             <a:r>
-              <a:rPr lang="de-DE" sz="1100" dirty="0" smtClean="0"/>
-              <a:t> </a:t>
-            </a:r>
-            <a:r>
-              <a:rPr lang="de-DE" sz="1100" dirty="0" err="1" smtClean="0"/>
+              <a:rPr lang="de-DE" sz="1100" dirty="0"/>
+              <a:t> </a:t>
+            </a:r>
+            <a:r>
+              <a:rPr lang="de-DE" sz="1100" dirty="0" err="1"/>
               <a:t>sets</a:t>
             </a:r>
             <a:r>
-              <a:rPr lang="de-DE" sz="1100" dirty="0" smtClean="0"/>
+              <a:rPr lang="de-DE" sz="1100" dirty="0"/>
               <a:t>; </a:t>
             </a:r>
             <a:r>
-              <a:rPr lang="de-DE" sz="1100" dirty="0" err="1" smtClean="0"/>
+              <a:rPr lang="de-DE" sz="1100" dirty="0" err="1"/>
               <a:t>run</a:t>
             </a:r>
             <a:r>
-              <a:rPr lang="de-DE" sz="1100" dirty="0" smtClean="0"/>
+              <a:rPr lang="de-DE" sz="1100" dirty="0"/>
               <a:t> ICA on </a:t>
             </a:r>
             <a:r>
-              <a:rPr lang="de-DE" sz="1100" dirty="0" err="1" smtClean="0"/>
+              <a:rPr lang="de-DE" sz="1100" dirty="0" err="1"/>
               <a:t>merged</a:t>
             </a:r>
             <a:r>
-              <a:rPr lang="de-DE" sz="1100" dirty="0" smtClean="0"/>
-              <a:t> </a:t>
-            </a:r>
-            <a:r>
-              <a:rPr lang="de-DE" sz="1100" dirty="0" err="1" smtClean="0"/>
+              <a:rPr lang="de-DE" sz="1100" dirty="0"/>
+              <a:t> </a:t>
+            </a:r>
+            <a:r>
+              <a:rPr lang="de-DE" sz="1100" dirty="0" err="1"/>
               <a:t>data</a:t>
             </a:r>
             <a:r>
-              <a:rPr lang="de-DE" sz="1100" dirty="0" smtClean="0"/>
-              <a:t> </a:t>
-            </a:r>
-            <a:r>
-              <a:rPr lang="de-DE" sz="1100" dirty="0" err="1" smtClean="0"/>
+              <a:rPr lang="de-DE" sz="1100" dirty="0"/>
+              <a:t> </a:t>
+            </a:r>
+            <a:r>
+              <a:rPr lang="de-DE" sz="1100" dirty="0" err="1"/>
               <a:t>and</a:t>
             </a:r>
             <a:r>
-              <a:rPr lang="de-DE" sz="1100" dirty="0" smtClean="0"/>
+              <a:rPr lang="de-DE" sz="1100" dirty="0"/>
               <a:t> save </a:t>
             </a:r>
             <a:r>
-              <a:rPr lang="de-DE" sz="1100" dirty="0" err="1" smtClean="0"/>
+              <a:rPr lang="de-DE" sz="1100" dirty="0" err="1"/>
               <a:t>merged</a:t>
             </a:r>
             <a:r>
-              <a:rPr lang="de-DE" sz="1100" dirty="0" smtClean="0"/>
-              <a:t> </a:t>
-            </a:r>
-            <a:r>
-              <a:rPr lang="de-DE" sz="1100" dirty="0" err="1" smtClean="0"/>
+              <a:rPr lang="de-DE" sz="1100" dirty="0"/>
+              <a:t> </a:t>
+            </a:r>
+            <a:r>
+              <a:rPr lang="de-DE" sz="1100" dirty="0" err="1"/>
               <a:t>data</a:t>
             </a:r>
             <a:r>
-              <a:rPr lang="de-DE" sz="1100" dirty="0" smtClean="0"/>
-              <a:t> </a:t>
-            </a:r>
-            <a:r>
-              <a:rPr lang="de-DE" sz="1100" dirty="0" err="1" smtClean="0"/>
+              <a:rPr lang="de-DE" sz="1100" dirty="0"/>
+              <a:t> </a:t>
+            </a:r>
+            <a:r>
+              <a:rPr lang="de-DE" sz="1100" dirty="0" err="1"/>
               <a:t>with</a:t>
             </a:r>
             <a:r>
-              <a:rPr lang="de-DE" sz="1100" dirty="0" smtClean="0"/>
-              <a:t> </a:t>
-            </a:r>
-            <a:r>
-              <a:rPr lang="de-DE" sz="1100" dirty="0" err="1" smtClean="0"/>
+              <a:rPr lang="de-DE" sz="1100" dirty="0"/>
+              <a:t> </a:t>
+            </a:r>
+            <a:r>
+              <a:rPr lang="de-DE" sz="1100" dirty="0" err="1"/>
               <a:t>Ics</a:t>
             </a:r>
             <a:r>
-              <a:rPr lang="de-DE" sz="1100" dirty="0" smtClean="0"/>
+              <a:rPr lang="de-DE" sz="1100" dirty="0"/>
               <a:t> (_</a:t>
             </a:r>
             <a:r>
-              <a:rPr lang="de-DE" sz="1100" dirty="0" err="1" smtClean="0"/>
+              <a:rPr lang="de-DE" sz="1100" dirty="0" err="1"/>
               <a:t>ICA_merged_new</a:t>
             </a:r>
             <a:r>
-              <a:rPr lang="de-DE" sz="1100" dirty="0" smtClean="0"/>
+              <a:rPr lang="de-DE" sz="1100" dirty="0"/>
               <a:t>)</a:t>
             </a:r>
           </a:p>
@@ -3668,7 +3702,7 @@
           <a:lstStyle/>
           <a:p>
             <a:r>
-              <a:rPr lang="de-DE" sz="1100" b="1" i="1" dirty="0" smtClean="0">
+              <a:rPr lang="de-DE" sz="1100" b="1" i="1" dirty="0">
                 <a:solidFill>
                   <a:schemeClr val="bg2">
                     <a:lumMod val="50000"/>
@@ -3680,7 +3714,7 @@
           </a:p>
           <a:p>
             <a:r>
-              <a:rPr lang="de-DE" sz="1100" dirty="0" smtClean="0">
+              <a:rPr lang="de-DE" sz="1100" dirty="0">
                 <a:solidFill>
                   <a:schemeClr val="bg2">
                     <a:lumMod val="50000"/>
@@ -3690,7 +3724,7 @@
               <a:t>Run </a:t>
             </a:r>
             <a:r>
-              <a:rPr lang="de-DE" sz="1100" dirty="0" err="1" smtClean="0">
+              <a:rPr lang="de-DE" sz="1100" dirty="0" err="1">
                 <a:solidFill>
                   <a:schemeClr val="bg2">
                     <a:lumMod val="50000"/>
@@ -3700,7 +3734,7 @@
               <a:t>Iclabel</a:t>
             </a:r>
             <a:r>
-              <a:rPr lang="de-DE" sz="1100" dirty="0" smtClean="0">
+              <a:rPr lang="de-DE" sz="1100" dirty="0">
                 <a:solidFill>
                   <a:schemeClr val="bg2">
                     <a:lumMod val="50000"/>
@@ -3710,7 +3744,7 @@
               <a:t> on </a:t>
             </a:r>
             <a:r>
-              <a:rPr lang="de-DE" sz="1100" dirty="0" err="1" smtClean="0">
+              <a:rPr lang="de-DE" sz="1100" dirty="0" err="1">
                 <a:solidFill>
                   <a:schemeClr val="bg2">
                     <a:lumMod val="50000"/>
@@ -3720,7 +3754,7 @@
               <a:t>merged</a:t>
             </a:r>
             <a:r>
-              <a:rPr lang="de-DE" sz="1100" dirty="0" smtClean="0">
+              <a:rPr lang="de-DE" sz="1100" dirty="0">
                 <a:solidFill>
                   <a:schemeClr val="bg2">
                     <a:lumMod val="50000"/>
@@ -3730,7 +3764,7 @@
               <a:t> </a:t>
             </a:r>
             <a:r>
-              <a:rPr lang="de-DE" sz="1100" dirty="0" err="1" smtClean="0">
+              <a:rPr lang="de-DE" sz="1100" dirty="0" err="1">
                 <a:solidFill>
                   <a:schemeClr val="bg2">
                     <a:lumMod val="50000"/>
@@ -3740,7 +3774,7 @@
               <a:t>continuous</a:t>
             </a:r>
             <a:r>
-              <a:rPr lang="de-DE" sz="1100" dirty="0" smtClean="0">
+              <a:rPr lang="de-DE" sz="1100" dirty="0">
                 <a:solidFill>
                   <a:schemeClr val="bg2">
                     <a:lumMod val="50000"/>
@@ -3750,7 +3784,7 @@
               <a:t> </a:t>
             </a:r>
             <a:r>
-              <a:rPr lang="de-DE" sz="1100" dirty="0" err="1" smtClean="0">
+              <a:rPr lang="de-DE" sz="1100" dirty="0" err="1">
                 <a:solidFill>
                   <a:schemeClr val="bg2">
                     <a:lumMod val="50000"/>
@@ -3760,7 +3794,7 @@
               <a:t>data</a:t>
             </a:r>
             <a:r>
-              <a:rPr lang="de-DE" sz="1100" dirty="0" smtClean="0">
+              <a:rPr lang="de-DE" sz="1100" dirty="0">
                 <a:solidFill>
                   <a:schemeClr val="bg2">
                     <a:lumMod val="50000"/>
@@ -3770,7 +3804,7 @@
               <a:t> </a:t>
             </a:r>
             <a:r>
-              <a:rPr lang="de-DE" sz="1100" dirty="0" err="1" smtClean="0">
+              <a:rPr lang="de-DE" sz="1100" dirty="0" err="1">
                 <a:solidFill>
                   <a:schemeClr val="bg2">
                     <a:lumMod val="50000"/>
@@ -3780,7 +3814,7 @@
               <a:t>with</a:t>
             </a:r>
             <a:r>
-              <a:rPr lang="de-DE" sz="1100" dirty="0" smtClean="0">
+              <a:rPr lang="de-DE" sz="1100" dirty="0">
                 <a:solidFill>
                   <a:schemeClr val="bg2">
                     <a:lumMod val="50000"/>
@@ -3790,7 +3824,7 @@
               <a:t> </a:t>
             </a:r>
             <a:r>
-              <a:rPr lang="de-DE" sz="1100" dirty="0" err="1" smtClean="0">
+              <a:rPr lang="de-DE" sz="1100" dirty="0" err="1">
                 <a:solidFill>
                   <a:schemeClr val="bg2">
                     <a:lumMod val="50000"/>
@@ -3800,7 +3834,7 @@
               <a:t>Ics</a:t>
             </a:r>
             <a:r>
-              <a:rPr lang="de-DE" sz="1100" dirty="0" smtClean="0">
+              <a:rPr lang="de-DE" sz="1100" dirty="0">
                 <a:solidFill>
                   <a:schemeClr val="bg2">
                     <a:lumMod val="50000"/>
@@ -3810,7 +3844,7 @@
               <a:t>, </a:t>
             </a:r>
             <a:r>
-              <a:rPr lang="de-DE" sz="1100" dirty="0" err="1" smtClean="0">
+              <a:rPr lang="de-DE" sz="1100" dirty="0" err="1">
                 <a:solidFill>
                   <a:schemeClr val="bg2">
                     <a:lumMod val="50000"/>
@@ -3820,7 +3854,7 @@
               <a:t>exclude</a:t>
             </a:r>
             <a:r>
-              <a:rPr lang="de-DE" sz="1100" dirty="0" smtClean="0">
+              <a:rPr lang="de-DE" sz="1100" dirty="0">
                 <a:solidFill>
                   <a:schemeClr val="bg2">
                     <a:lumMod val="50000"/>
@@ -3830,7 +3864,7 @@
               <a:t> all non-</a:t>
             </a:r>
             <a:r>
-              <a:rPr lang="de-DE" sz="1100" dirty="0" err="1" smtClean="0">
+              <a:rPr lang="de-DE" sz="1100" dirty="0" err="1">
                 <a:solidFill>
                   <a:schemeClr val="bg2">
                     <a:lumMod val="50000"/>
@@ -3840,7 +3874,7 @@
               <a:t>brain</a:t>
             </a:r>
             <a:r>
-              <a:rPr lang="de-DE" sz="1100" dirty="0" smtClean="0">
+              <a:rPr lang="de-DE" sz="1100" dirty="0">
                 <a:solidFill>
                   <a:schemeClr val="bg2">
                     <a:lumMod val="50000"/>
@@ -3850,7 +3884,7 @@
               <a:t> </a:t>
             </a:r>
             <a:r>
-              <a:rPr lang="de-DE" sz="1100" dirty="0" err="1" smtClean="0">
+              <a:rPr lang="de-DE" sz="1100" dirty="0" err="1">
                 <a:solidFill>
                   <a:schemeClr val="bg2">
                     <a:lumMod val="50000"/>
@@ -3860,7 +3894,7 @@
               <a:t>components</a:t>
             </a:r>
             <a:r>
-              <a:rPr lang="de-DE" sz="1100" dirty="0" smtClean="0">
+              <a:rPr lang="de-DE" sz="1100" dirty="0">
                 <a:solidFill>
                   <a:schemeClr val="bg2">
                     <a:lumMod val="50000"/>
@@ -3870,7 +3904,7 @@
               <a:t> + </a:t>
             </a:r>
             <a:r>
-              <a:rPr lang="de-DE" sz="1100" dirty="0" err="1" smtClean="0">
+              <a:rPr lang="de-DE" sz="1100" dirty="0" err="1">
                 <a:solidFill>
                   <a:schemeClr val="bg2">
                     <a:lumMod val="50000"/>
@@ -3880,7 +3914,7 @@
               <a:t>run</a:t>
             </a:r>
             <a:r>
-              <a:rPr lang="de-DE" sz="1100" dirty="0" smtClean="0">
+              <a:rPr lang="de-DE" sz="1100" dirty="0">
                 <a:solidFill>
                   <a:schemeClr val="bg2">
                     <a:lumMod val="50000"/>
@@ -3890,7 +3924,7 @@
               <a:t> </a:t>
             </a:r>
             <a:r>
-              <a:rPr lang="de-DE" sz="1100" dirty="0" err="1" smtClean="0">
+              <a:rPr lang="de-DE" sz="1100" dirty="0" err="1">
                 <a:solidFill>
                   <a:schemeClr val="bg2">
                     <a:lumMod val="50000"/>
@@ -3900,7 +3934,7 @@
               <a:t>visual</a:t>
             </a:r>
             <a:r>
-              <a:rPr lang="de-DE" sz="1100" dirty="0" smtClean="0">
+              <a:rPr lang="de-DE" sz="1100" dirty="0">
                 <a:solidFill>
                   <a:schemeClr val="bg2">
                     <a:lumMod val="50000"/>
@@ -3910,7 +3944,7 @@
               <a:t> check </a:t>
             </a:r>
             <a:r>
-              <a:rPr lang="de-DE" sz="1100" dirty="0" err="1" smtClean="0">
+              <a:rPr lang="de-DE" sz="1100" dirty="0" err="1">
                 <a:solidFill>
                   <a:schemeClr val="bg2">
                     <a:lumMod val="50000"/>
@@ -3920,7 +3954,7 @@
               <a:t>of</a:t>
             </a:r>
             <a:r>
-              <a:rPr lang="de-DE" sz="1100" dirty="0" smtClean="0">
+              <a:rPr lang="de-DE" sz="1100" dirty="0">
                 <a:solidFill>
                   <a:schemeClr val="bg2">
                     <a:lumMod val="50000"/>
@@ -3930,7 +3964,7 @@
               <a:t> </a:t>
             </a:r>
             <a:r>
-              <a:rPr lang="de-DE" sz="1100" dirty="0" err="1" smtClean="0">
+              <a:rPr lang="de-DE" sz="1100" dirty="0" err="1">
                 <a:solidFill>
                   <a:schemeClr val="bg2">
                     <a:lumMod val="50000"/>
@@ -3940,7 +3974,7 @@
               <a:t>first</a:t>
             </a:r>
             <a:r>
-              <a:rPr lang="de-DE" sz="1100" dirty="0" smtClean="0">
+              <a:rPr lang="de-DE" sz="1100" dirty="0">
                 <a:solidFill>
                   <a:schemeClr val="bg2">
                     <a:lumMod val="50000"/>
@@ -3950,7 +3984,7 @@
               <a:t> 5 </a:t>
             </a:r>
             <a:r>
-              <a:rPr lang="de-DE" sz="1100" dirty="0" err="1" smtClean="0">
+              <a:rPr lang="de-DE" sz="1100" dirty="0" err="1">
                 <a:solidFill>
                   <a:schemeClr val="bg2">
                     <a:lumMod val="50000"/>
@@ -3960,7 +3994,7 @@
               <a:t>remaining</a:t>
             </a:r>
             <a:r>
-              <a:rPr lang="de-DE" sz="1100" dirty="0" smtClean="0">
+              <a:rPr lang="de-DE" sz="1100" dirty="0">
                 <a:solidFill>
                   <a:schemeClr val="bg2">
                     <a:lumMod val="50000"/>
@@ -3970,7 +4004,7 @@
               <a:t> </a:t>
             </a:r>
             <a:r>
-              <a:rPr lang="de-DE" sz="1100" dirty="0" err="1" smtClean="0">
+              <a:rPr lang="de-DE" sz="1100" dirty="0" err="1">
                 <a:solidFill>
                   <a:schemeClr val="bg2">
                     <a:lumMod val="50000"/>
@@ -3980,7 +4014,7 @@
               <a:t>components</a:t>
             </a:r>
             <a:r>
-              <a:rPr lang="de-DE" sz="1100" dirty="0" smtClean="0">
+              <a:rPr lang="de-DE" sz="1100" dirty="0">
                 <a:solidFill>
                   <a:schemeClr val="bg2">
                     <a:lumMod val="50000"/>
@@ -3990,7 +4024,7 @@
               <a:t>, save </a:t>
             </a:r>
             <a:r>
-              <a:rPr lang="de-DE" sz="1100" dirty="0" err="1" smtClean="0">
+              <a:rPr lang="de-DE" sz="1100" dirty="0" err="1">
                 <a:solidFill>
                   <a:schemeClr val="bg2">
                     <a:lumMod val="50000"/>
@@ -4000,7 +4034,7 @@
               <a:t>excluded</a:t>
             </a:r>
             <a:r>
-              <a:rPr lang="de-DE" sz="1100" dirty="0" smtClean="0">
+              <a:rPr lang="de-DE" sz="1100" dirty="0">
                 <a:solidFill>
                   <a:schemeClr val="bg2">
                     <a:lumMod val="50000"/>
@@ -4010,7 +4044,7 @@
               <a:t> </a:t>
             </a:r>
             <a:r>
-              <a:rPr lang="de-DE" sz="1100" dirty="0" err="1" smtClean="0">
+              <a:rPr lang="de-DE" sz="1100" dirty="0" err="1">
                 <a:solidFill>
                   <a:schemeClr val="bg2">
                     <a:lumMod val="50000"/>
@@ -4020,7 +4054,7 @@
               <a:t>Ics</a:t>
             </a:r>
             <a:r>
-              <a:rPr lang="de-DE" sz="1100" dirty="0" smtClean="0">
+              <a:rPr lang="de-DE" sz="1100" dirty="0">
                 <a:solidFill>
                   <a:schemeClr val="bg2">
                     <a:lumMod val="50000"/>
@@ -4030,7 +4064,7 @@
               <a:t> in </a:t>
             </a:r>
             <a:r>
-              <a:rPr lang="de-DE" sz="1100" dirty="0" err="1" smtClean="0">
+              <a:rPr lang="de-DE" sz="1100" dirty="0" err="1">
                 <a:solidFill>
                   <a:schemeClr val="bg2">
                     <a:lumMod val="50000"/>
@@ -4040,7 +4074,7 @@
               <a:t>structure</a:t>
             </a:r>
             <a:r>
-              <a:rPr lang="de-DE" sz="1100" dirty="0" smtClean="0">
+              <a:rPr lang="de-DE" sz="1100" dirty="0">
                 <a:solidFill>
                   <a:schemeClr val="bg2">
                     <a:lumMod val="50000"/>
@@ -4050,7 +4084,7 @@
               <a:t> </a:t>
             </a:r>
             <a:r>
-              <a:rPr lang="de-DE" sz="1100" dirty="0" err="1" smtClean="0">
+              <a:rPr lang="de-DE" sz="1100" dirty="0" err="1">
                 <a:solidFill>
                   <a:schemeClr val="bg2">
                     <a:lumMod val="50000"/>
@@ -4060,7 +4094,7 @@
               <a:t>and</a:t>
             </a:r>
             <a:r>
-              <a:rPr lang="de-DE" sz="1100" dirty="0" smtClean="0">
+              <a:rPr lang="de-DE" sz="1100" dirty="0">
                 <a:solidFill>
                   <a:schemeClr val="bg2">
                     <a:lumMod val="50000"/>
@@ -4070,7 +4104,7 @@
               <a:t> save </a:t>
             </a:r>
             <a:r>
-              <a:rPr lang="de-DE" sz="1100" dirty="0" err="1" smtClean="0">
+              <a:rPr lang="de-DE" sz="1100" dirty="0" err="1">
                 <a:solidFill>
                   <a:schemeClr val="bg2">
                     <a:lumMod val="50000"/>
@@ -4080,7 +4114,7 @@
               <a:t>merged</a:t>
             </a:r>
             <a:r>
-              <a:rPr lang="de-DE" sz="1100" dirty="0" smtClean="0">
+              <a:rPr lang="de-DE" sz="1100" dirty="0">
                 <a:solidFill>
                   <a:schemeClr val="bg2">
                     <a:lumMod val="50000"/>
@@ -4090,7 +4124,7 @@
               <a:t> </a:t>
             </a:r>
             <a:r>
-              <a:rPr lang="de-DE" sz="1100" dirty="0" err="1" smtClean="0">
+              <a:rPr lang="de-DE" sz="1100" dirty="0" err="1">
                 <a:solidFill>
                   <a:schemeClr val="bg2">
                     <a:lumMod val="50000"/>
@@ -4100,7 +4134,7 @@
               <a:t>continuous</a:t>
             </a:r>
             <a:r>
-              <a:rPr lang="de-DE" sz="1100" dirty="0" smtClean="0">
+              <a:rPr lang="de-DE" sz="1100" dirty="0">
                 <a:solidFill>
                   <a:schemeClr val="bg2">
                     <a:lumMod val="50000"/>
@@ -4110,7 +4144,7 @@
               <a:t> </a:t>
             </a:r>
             <a:r>
-              <a:rPr lang="de-DE" sz="1100" dirty="0" err="1" smtClean="0">
+              <a:rPr lang="de-DE" sz="1100" dirty="0" err="1">
                 <a:solidFill>
                   <a:schemeClr val="bg2">
                     <a:lumMod val="50000"/>
@@ -4120,7 +4154,7 @@
               <a:t>data</a:t>
             </a:r>
             <a:r>
-              <a:rPr lang="de-DE" sz="1100" dirty="0" smtClean="0">
+              <a:rPr lang="de-DE" sz="1100" dirty="0">
                 <a:solidFill>
                   <a:schemeClr val="bg2">
                     <a:lumMod val="50000"/>
@@ -4130,7 +4164,7 @@
               <a:t> </a:t>
             </a:r>
             <a:r>
-              <a:rPr lang="de-DE" sz="1100" dirty="0" err="1" smtClean="0">
+              <a:rPr lang="de-DE" sz="1100" dirty="0" err="1">
                 <a:solidFill>
                   <a:schemeClr val="bg2">
                     <a:lumMod val="50000"/>
@@ -4140,7 +4174,7 @@
               <a:t>cleaned</a:t>
             </a:r>
             <a:r>
-              <a:rPr lang="de-DE" sz="1100" dirty="0" smtClean="0">
+              <a:rPr lang="de-DE" sz="1100" dirty="0">
                 <a:solidFill>
                   <a:schemeClr val="bg2">
                     <a:lumMod val="50000"/>
@@ -4150,7 +4184,7 @@
               <a:t> </a:t>
             </a:r>
             <a:r>
-              <a:rPr lang="de-DE" sz="1100" dirty="0" err="1" smtClean="0">
+              <a:rPr lang="de-DE" sz="1100" dirty="0" err="1">
                 <a:solidFill>
                   <a:schemeClr val="bg2">
                     <a:lumMod val="50000"/>
@@ -4160,7 +4194,7 @@
               <a:t>from</a:t>
             </a:r>
             <a:r>
-              <a:rPr lang="de-DE" sz="1100" dirty="0" smtClean="0">
+              <a:rPr lang="de-DE" sz="1100" dirty="0">
                 <a:solidFill>
                   <a:schemeClr val="bg2">
                     <a:lumMod val="50000"/>
@@ -4170,7 +4204,7 @@
               <a:t> non-</a:t>
             </a:r>
             <a:r>
-              <a:rPr lang="de-DE" sz="1100" dirty="0" err="1" smtClean="0">
+              <a:rPr lang="de-DE" sz="1100" dirty="0" err="1">
                 <a:solidFill>
                   <a:schemeClr val="bg2">
                     <a:lumMod val="50000"/>
@@ -4180,7 +4214,7 @@
               <a:t>brain</a:t>
             </a:r>
             <a:r>
-              <a:rPr lang="de-DE" sz="1100" dirty="0" smtClean="0">
+              <a:rPr lang="de-DE" sz="1100" dirty="0">
                 <a:solidFill>
                   <a:schemeClr val="bg2">
                     <a:lumMod val="50000"/>
@@ -4190,7 +4224,7 @@
               <a:t> </a:t>
             </a:r>
             <a:r>
-              <a:rPr lang="de-DE" sz="1100" dirty="0" err="1" smtClean="0">
+              <a:rPr lang="de-DE" sz="1100" dirty="0" err="1">
                 <a:solidFill>
                   <a:schemeClr val="bg2">
                     <a:lumMod val="50000"/>
@@ -4200,7 +4234,7 @@
               <a:t>signals</a:t>
             </a:r>
             <a:r>
-              <a:rPr lang="de-DE" sz="1100" dirty="0" smtClean="0">
+              <a:rPr lang="de-DE" sz="1100" dirty="0">
                 <a:solidFill>
                   <a:schemeClr val="bg2">
                     <a:lumMod val="50000"/>
@@ -4210,7 +4244,7 @@
               <a:t> (-</a:t>
             </a:r>
             <a:r>
-              <a:rPr lang="de-DE" sz="1100" dirty="0" err="1" smtClean="0">
+              <a:rPr lang="de-DE" sz="1100" dirty="0" err="1">
                 <a:solidFill>
                   <a:schemeClr val="bg2">
                     <a:lumMod val="50000"/>
@@ -4229,13 +4263,6 @@
               </a:rPr>
               <a:t>)</a:t>
             </a:r>
-            <a:endParaRPr lang="de-DE" sz="1100" dirty="0" smtClean="0">
-              <a:solidFill>
-                <a:schemeClr val="bg2">
-                  <a:lumMod val="50000"/>
-                </a:schemeClr>
-              </a:solidFill>
-            </a:endParaRPr>
           </a:p>
         </p:txBody>
       </p:sp>
@@ -4276,400 +4303,399 @@
           <a:lstStyle/>
           <a:p>
             <a:r>
-              <a:rPr lang="de-DE" sz="1100" b="1" i="1" dirty="0" err="1" smtClean="0"/>
-              <a:t>tracking_C_merged_Iclabel_separate.m</a:t>
-            </a:r>
-            <a:endParaRPr lang="de-DE" sz="1100" b="1" i="1" dirty="0" smtClean="0"/>
-          </a:p>
-          <a:p>
-            <a:r>
-              <a:rPr lang="de-DE" sz="1100" dirty="0" smtClean="0"/>
+              <a:rPr lang="de-DE" sz="1100" b="1" i="1" dirty="0"/>
+              <a:t>tracking_3_merged_Iclabel_separate.m</a:t>
+            </a:r>
+          </a:p>
+          <a:p>
+            <a:r>
+              <a:rPr lang="de-DE" sz="1100" dirty="0"/>
               <a:t>Run </a:t>
             </a:r>
             <a:r>
-              <a:rPr lang="de-DE" sz="1100" dirty="0" err="1" smtClean="0"/>
+              <a:rPr lang="de-DE" sz="1100" dirty="0" err="1"/>
               <a:t>Iclabel</a:t>
             </a:r>
             <a:r>
-              <a:rPr lang="de-DE" sz="1100" dirty="0" smtClean="0"/>
+              <a:rPr lang="de-DE" sz="1100" dirty="0"/>
               <a:t> on </a:t>
             </a:r>
             <a:r>
-              <a:rPr lang="de-DE" sz="1100" dirty="0" err="1" smtClean="0"/>
+              <a:rPr lang="de-DE" sz="1100" dirty="0" err="1"/>
               <a:t>merged</a:t>
             </a:r>
             <a:r>
-              <a:rPr lang="de-DE" sz="1100" dirty="0" smtClean="0"/>
-              <a:t> </a:t>
-            </a:r>
-            <a:r>
-              <a:rPr lang="de-DE" sz="1100" dirty="0" err="1" smtClean="0"/>
+              <a:rPr lang="de-DE" sz="1100" dirty="0"/>
+              <a:t> </a:t>
+            </a:r>
+            <a:r>
+              <a:rPr lang="de-DE" sz="1100" dirty="0" err="1"/>
               <a:t>continuous</a:t>
             </a:r>
             <a:r>
-              <a:rPr lang="de-DE" sz="1100" dirty="0" smtClean="0"/>
-              <a:t> </a:t>
-            </a:r>
-            <a:r>
-              <a:rPr lang="de-DE" sz="1100" dirty="0" err="1" smtClean="0"/>
+              <a:rPr lang="de-DE" sz="1100" dirty="0"/>
+              <a:t> </a:t>
+            </a:r>
+            <a:r>
+              <a:rPr lang="de-DE" sz="1100" dirty="0" err="1"/>
               <a:t>data</a:t>
             </a:r>
             <a:r>
-              <a:rPr lang="de-DE" sz="1100" dirty="0" smtClean="0"/>
-              <a:t> </a:t>
-            </a:r>
-            <a:r>
-              <a:rPr lang="de-DE" sz="1100" dirty="0" err="1" smtClean="0"/>
+              <a:rPr lang="de-DE" sz="1100" dirty="0"/>
+              <a:t> </a:t>
+            </a:r>
+            <a:r>
+              <a:rPr lang="de-DE" sz="1100" dirty="0" err="1"/>
               <a:t>with</a:t>
             </a:r>
             <a:r>
-              <a:rPr lang="de-DE" sz="1100" dirty="0" smtClean="0"/>
-              <a:t> </a:t>
-            </a:r>
-            <a:r>
-              <a:rPr lang="de-DE" sz="1100" dirty="0" err="1" smtClean="0"/>
+              <a:rPr lang="de-DE" sz="1100" dirty="0"/>
+              <a:t> </a:t>
+            </a:r>
+            <a:r>
+              <a:rPr lang="de-DE" sz="1100" dirty="0" err="1"/>
               <a:t>Ics</a:t>
             </a:r>
             <a:r>
-              <a:rPr lang="de-DE" sz="1100" dirty="0" smtClean="0"/>
+              <a:rPr lang="de-DE" sz="1100" dirty="0"/>
               <a:t>, </a:t>
             </a:r>
             <a:r>
-              <a:rPr lang="de-DE" sz="1100" dirty="0" err="1" smtClean="0"/>
+              <a:rPr lang="de-DE" sz="1100" dirty="0" err="1"/>
               <a:t>exclude</a:t>
             </a:r>
             <a:r>
-              <a:rPr lang="de-DE" sz="1100" dirty="0" smtClean="0"/>
+              <a:rPr lang="de-DE" sz="1100" dirty="0"/>
               <a:t> all non-</a:t>
             </a:r>
             <a:r>
-              <a:rPr lang="de-DE" sz="1100" dirty="0" err="1" smtClean="0"/>
+              <a:rPr lang="de-DE" sz="1100" dirty="0" err="1"/>
               <a:t>brain</a:t>
             </a:r>
             <a:r>
-              <a:rPr lang="de-DE" sz="1100" dirty="0" smtClean="0"/>
-              <a:t> </a:t>
-            </a:r>
-            <a:r>
-              <a:rPr lang="de-DE" sz="1100" dirty="0" err="1" smtClean="0"/>
+              <a:rPr lang="de-DE" sz="1100" dirty="0"/>
+              <a:t> </a:t>
+            </a:r>
+            <a:r>
+              <a:rPr lang="de-DE" sz="1100" dirty="0" err="1"/>
               <a:t>components</a:t>
             </a:r>
             <a:r>
-              <a:rPr lang="de-DE" sz="1100" dirty="0" smtClean="0"/>
+              <a:rPr lang="de-DE" sz="1100" dirty="0"/>
               <a:t> + </a:t>
             </a:r>
             <a:r>
-              <a:rPr lang="de-DE" sz="1100" dirty="0" err="1" smtClean="0"/>
+              <a:rPr lang="de-DE" sz="1100" dirty="0" err="1"/>
               <a:t>run</a:t>
             </a:r>
             <a:r>
-              <a:rPr lang="de-DE" sz="1100" dirty="0" smtClean="0"/>
-              <a:t> </a:t>
-            </a:r>
-            <a:r>
-              <a:rPr lang="de-DE" sz="1100" dirty="0" err="1" smtClean="0"/>
+              <a:rPr lang="de-DE" sz="1100" dirty="0"/>
+              <a:t> </a:t>
+            </a:r>
+            <a:r>
+              <a:rPr lang="de-DE" sz="1100" dirty="0" err="1"/>
               <a:t>visual</a:t>
             </a:r>
             <a:r>
-              <a:rPr lang="de-DE" sz="1100" dirty="0" smtClean="0"/>
+              <a:rPr lang="de-DE" sz="1100" dirty="0"/>
               <a:t> check </a:t>
             </a:r>
             <a:r>
-              <a:rPr lang="de-DE" sz="1100" dirty="0" err="1" smtClean="0"/>
+              <a:rPr lang="de-DE" sz="1100" dirty="0" err="1"/>
               <a:t>of</a:t>
             </a:r>
             <a:r>
-              <a:rPr lang="de-DE" sz="1100" dirty="0" smtClean="0"/>
-              <a:t> </a:t>
-            </a:r>
-            <a:r>
-              <a:rPr lang="de-DE" sz="1100" dirty="0" err="1" smtClean="0"/>
+              <a:rPr lang="de-DE" sz="1100" dirty="0"/>
+              <a:t> </a:t>
+            </a:r>
+            <a:r>
+              <a:rPr lang="de-DE" sz="1100" dirty="0" err="1"/>
               <a:t>first</a:t>
             </a:r>
             <a:r>
-              <a:rPr lang="de-DE" sz="1100" dirty="0" smtClean="0"/>
+              <a:rPr lang="de-DE" sz="1100" dirty="0"/>
               <a:t> 5 </a:t>
             </a:r>
             <a:r>
-              <a:rPr lang="de-DE" sz="1100" dirty="0" err="1" smtClean="0"/>
+              <a:rPr lang="de-DE" sz="1100" dirty="0" err="1"/>
               <a:t>remaining</a:t>
             </a:r>
             <a:r>
-              <a:rPr lang="de-DE" sz="1100" dirty="0" smtClean="0"/>
-              <a:t> </a:t>
-            </a:r>
-            <a:r>
-              <a:rPr lang="de-DE" sz="1100" dirty="0" err="1" smtClean="0"/>
+              <a:rPr lang="de-DE" sz="1100" dirty="0"/>
+              <a:t> </a:t>
+            </a:r>
+            <a:r>
+              <a:rPr lang="de-DE" sz="1100" dirty="0" err="1"/>
               <a:t>components</a:t>
             </a:r>
             <a:r>
-              <a:rPr lang="de-DE" sz="1100" dirty="0" smtClean="0"/>
+              <a:rPr lang="de-DE" sz="1100" dirty="0"/>
               <a:t>, save </a:t>
             </a:r>
             <a:r>
-              <a:rPr lang="de-DE" sz="1100" dirty="0" err="1" smtClean="0"/>
+              <a:rPr lang="de-DE" sz="1100" dirty="0" err="1"/>
               <a:t>excluded</a:t>
             </a:r>
             <a:r>
-              <a:rPr lang="de-DE" sz="1100" dirty="0" smtClean="0"/>
-              <a:t> </a:t>
-            </a:r>
-            <a:r>
-              <a:rPr lang="de-DE" sz="1100" dirty="0" err="1" smtClean="0"/>
+              <a:rPr lang="de-DE" sz="1100" dirty="0"/>
+              <a:t> </a:t>
+            </a:r>
+            <a:r>
+              <a:rPr lang="de-DE" sz="1100" dirty="0" err="1"/>
               <a:t>Ics</a:t>
             </a:r>
             <a:r>
-              <a:rPr lang="de-DE" sz="1100" dirty="0" smtClean="0"/>
+              <a:rPr lang="de-DE" sz="1100" dirty="0"/>
               <a:t> in </a:t>
             </a:r>
             <a:r>
-              <a:rPr lang="de-DE" sz="1100" dirty="0" err="1" smtClean="0"/>
+              <a:rPr lang="de-DE" sz="1100" dirty="0" err="1"/>
               <a:t>structure</a:t>
             </a:r>
             <a:r>
-              <a:rPr lang="de-DE" sz="1100" dirty="0" smtClean="0"/>
-              <a:t> </a:t>
-            </a:r>
-            <a:r>
-              <a:rPr lang="de-DE" sz="1100" dirty="0" err="1" smtClean="0"/>
+              <a:rPr lang="de-DE" sz="1100" dirty="0"/>
+              <a:t> </a:t>
+            </a:r>
+            <a:r>
+              <a:rPr lang="de-DE" sz="1100" dirty="0" err="1"/>
               <a:t>and</a:t>
             </a:r>
             <a:r>
-              <a:rPr lang="de-DE" sz="1100" dirty="0" smtClean="0"/>
+              <a:rPr lang="de-DE" sz="1100" dirty="0"/>
               <a:t> save </a:t>
             </a:r>
             <a:r>
-              <a:rPr lang="de-DE" sz="1100" dirty="0" err="1" smtClean="0"/>
+              <a:rPr lang="de-DE" sz="1100" dirty="0" err="1"/>
               <a:t>merged</a:t>
             </a:r>
             <a:r>
-              <a:rPr lang="de-DE" sz="1100" dirty="0" smtClean="0"/>
-              <a:t> </a:t>
-            </a:r>
-            <a:r>
-              <a:rPr lang="de-DE" sz="1100" dirty="0" err="1" smtClean="0"/>
+              <a:rPr lang="de-DE" sz="1100" dirty="0"/>
+              <a:t> </a:t>
+            </a:r>
+            <a:r>
+              <a:rPr lang="de-DE" sz="1100" dirty="0" err="1"/>
               <a:t>continuous</a:t>
             </a:r>
             <a:r>
-              <a:rPr lang="de-DE" sz="1100" dirty="0" smtClean="0"/>
-              <a:t> </a:t>
-            </a:r>
-            <a:r>
-              <a:rPr lang="de-DE" sz="1100" dirty="0" err="1" smtClean="0"/>
+              <a:rPr lang="de-DE" sz="1100" dirty="0"/>
+              <a:t> </a:t>
+            </a:r>
+            <a:r>
+              <a:rPr lang="de-DE" sz="1100" dirty="0" err="1"/>
               <a:t>data</a:t>
             </a:r>
             <a:r>
-              <a:rPr lang="de-DE" sz="1100" dirty="0" smtClean="0"/>
-              <a:t> </a:t>
-            </a:r>
-            <a:r>
-              <a:rPr lang="de-DE" sz="1100" dirty="0" err="1" smtClean="0"/>
+              <a:rPr lang="de-DE" sz="1100" dirty="0"/>
+              <a:t> </a:t>
+            </a:r>
+            <a:r>
+              <a:rPr lang="de-DE" sz="1100" dirty="0" err="1"/>
               <a:t>cleaned</a:t>
             </a:r>
             <a:r>
-              <a:rPr lang="de-DE" sz="1100" dirty="0" smtClean="0"/>
-              <a:t> </a:t>
-            </a:r>
-            <a:r>
-              <a:rPr lang="de-DE" sz="1100" dirty="0" err="1" smtClean="0"/>
+              <a:rPr lang="de-DE" sz="1100" dirty="0"/>
+              <a:t> </a:t>
+            </a:r>
+            <a:r>
+              <a:rPr lang="de-DE" sz="1100" dirty="0" err="1"/>
               <a:t>from</a:t>
             </a:r>
             <a:r>
-              <a:rPr lang="de-DE" sz="1100" dirty="0" smtClean="0"/>
+              <a:rPr lang="de-DE" sz="1100" dirty="0"/>
               <a:t> non-</a:t>
             </a:r>
             <a:r>
-              <a:rPr lang="de-DE" sz="1100" dirty="0" err="1" smtClean="0"/>
+              <a:rPr lang="de-DE" sz="1100" dirty="0" err="1"/>
               <a:t>brain</a:t>
             </a:r>
             <a:r>
-              <a:rPr lang="de-DE" sz="1100" dirty="0" smtClean="0"/>
-              <a:t> </a:t>
-            </a:r>
-            <a:r>
-              <a:rPr lang="de-DE" sz="1100" dirty="0" err="1" smtClean="0"/>
+              <a:rPr lang="de-DE" sz="1100" dirty="0"/>
+              <a:t> </a:t>
+            </a:r>
+            <a:r>
+              <a:rPr lang="de-DE" sz="1100" dirty="0" err="1"/>
               <a:t>signals</a:t>
             </a:r>
             <a:r>
-              <a:rPr lang="de-DE" sz="1100" dirty="0" smtClean="0"/>
+              <a:rPr lang="de-DE" sz="1100" dirty="0"/>
               <a:t> (-</a:t>
             </a:r>
             <a:r>
-              <a:rPr lang="de-DE" sz="1100" dirty="0" err="1" smtClean="0"/>
+              <a:rPr lang="de-DE" sz="1100" dirty="0" err="1"/>
               <a:t>icaclean</a:t>
             </a:r>
             <a:r>
-              <a:rPr lang="de-DE" sz="1100" dirty="0" smtClean="0"/>
+              <a:rPr lang="de-DE" sz="1100" dirty="0"/>
               <a:t>);</a:t>
             </a:r>
           </a:p>
           <a:p>
             <a:r>
-              <a:rPr lang="de-DE" sz="1100" dirty="0" smtClean="0"/>
+              <a:rPr lang="de-DE" sz="1100" dirty="0"/>
               <a:t>Create </a:t>
             </a:r>
             <a:r>
-              <a:rPr lang="de-DE" sz="1100" dirty="0" err="1" smtClean="0"/>
+              <a:rPr lang="de-DE" sz="1100" dirty="0" err="1"/>
               <a:t>epochs</a:t>
             </a:r>
             <a:r>
-              <a:rPr lang="de-DE" sz="1100" dirty="0" smtClean="0"/>
+              <a:rPr lang="de-DE" sz="1100" dirty="0"/>
               <a:t> A </a:t>
             </a:r>
             <a:r>
-              <a:rPr lang="de-DE" sz="1100" dirty="0" err="1" smtClean="0"/>
+              <a:rPr lang="de-DE" sz="1100" dirty="0" err="1"/>
               <a:t>and</a:t>
             </a:r>
             <a:r>
-              <a:rPr lang="de-DE" sz="1100" dirty="0" smtClean="0"/>
+              <a:rPr lang="de-DE" sz="1100" dirty="0"/>
               <a:t> B </a:t>
             </a:r>
             <a:r>
-              <a:rPr lang="de-DE" sz="1100" dirty="0" err="1" smtClean="0"/>
+              <a:rPr lang="de-DE" sz="1100" dirty="0" err="1"/>
               <a:t>events</a:t>
             </a:r>
             <a:r>
-              <a:rPr lang="de-DE" sz="1100" dirty="0" smtClean="0"/>
+              <a:rPr lang="de-DE" sz="1100" dirty="0"/>
               <a:t>, save </a:t>
             </a:r>
             <a:r>
-              <a:rPr lang="de-DE" sz="1100" dirty="0" err="1" smtClean="0"/>
+              <a:rPr lang="de-DE" sz="1100" dirty="0" err="1"/>
               <a:t>epoched</a:t>
             </a:r>
             <a:r>
-              <a:rPr lang="de-DE" sz="1100" dirty="0" smtClean="0"/>
-              <a:t> </a:t>
-            </a:r>
-            <a:r>
-              <a:rPr lang="de-DE" sz="1100" dirty="0" err="1" smtClean="0"/>
+              <a:rPr lang="de-DE" sz="1100" dirty="0"/>
+              <a:t> </a:t>
+            </a:r>
+            <a:r>
+              <a:rPr lang="de-DE" sz="1100" dirty="0" err="1"/>
               <a:t>data</a:t>
             </a:r>
             <a:r>
-              <a:rPr lang="de-DE" sz="1100" dirty="0" smtClean="0"/>
+              <a:rPr lang="de-DE" sz="1100" dirty="0"/>
               <a:t> (_</a:t>
             </a:r>
             <a:r>
-              <a:rPr lang="de-DE" sz="1100" dirty="0" err="1" smtClean="0"/>
+              <a:rPr lang="de-DE" sz="1100" dirty="0" err="1"/>
               <a:t>icaclean_epoched_A</a:t>
             </a:r>
             <a:r>
-              <a:rPr lang="de-DE" sz="1100" dirty="0" smtClean="0"/>
+              <a:rPr lang="de-DE" sz="1100" dirty="0"/>
               <a:t>/B);</a:t>
             </a:r>
           </a:p>
           <a:p>
             <a:r>
-              <a:rPr lang="de-DE" sz="1100" dirty="0" smtClean="0"/>
+              <a:rPr lang="de-DE" sz="1100" dirty="0"/>
               <a:t>Remove </a:t>
             </a:r>
             <a:r>
-              <a:rPr lang="de-DE" sz="1100" dirty="0" err="1" smtClean="0"/>
+              <a:rPr lang="de-DE" sz="1100" dirty="0" err="1"/>
               <a:t>baseline</a:t>
             </a:r>
             <a:r>
-              <a:rPr lang="de-DE" sz="1100" dirty="0" smtClean="0"/>
-              <a:t> </a:t>
-            </a:r>
-            <a:r>
-              <a:rPr lang="de-DE" sz="1100" dirty="0" err="1" smtClean="0"/>
+              <a:rPr lang="de-DE" sz="1100" dirty="0"/>
+              <a:t> </a:t>
+            </a:r>
+            <a:r>
+              <a:rPr lang="de-DE" sz="1100" dirty="0" err="1"/>
               <a:t>for</a:t>
             </a:r>
             <a:r>
-              <a:rPr lang="de-DE" sz="1100" dirty="0" smtClean="0"/>
+              <a:rPr lang="de-DE" sz="1100" dirty="0"/>
               <a:t> A </a:t>
             </a:r>
             <a:r>
-              <a:rPr lang="de-DE" sz="1100" dirty="0" err="1" smtClean="0"/>
+              <a:rPr lang="de-DE" sz="1100" dirty="0" err="1"/>
               <a:t>and</a:t>
             </a:r>
             <a:r>
-              <a:rPr lang="de-DE" sz="1100" dirty="0" smtClean="0"/>
+              <a:rPr lang="de-DE" sz="1100" dirty="0"/>
               <a:t> B </a:t>
             </a:r>
             <a:r>
-              <a:rPr lang="de-DE" sz="1100" dirty="0" err="1" smtClean="0"/>
+              <a:rPr lang="de-DE" sz="1100" dirty="0" err="1"/>
               <a:t>separaterly</a:t>
             </a:r>
             <a:r>
-              <a:rPr lang="de-DE" sz="1100" dirty="0" smtClean="0"/>
-              <a:t> </a:t>
-            </a:r>
-            <a:r>
-              <a:rPr lang="de-DE" sz="1100" dirty="0" err="1" smtClean="0"/>
+              <a:rPr lang="de-DE" sz="1100" dirty="0"/>
+              <a:t> </a:t>
+            </a:r>
+            <a:r>
+              <a:rPr lang="de-DE" sz="1100" dirty="0" err="1"/>
               <a:t>and</a:t>
             </a:r>
             <a:r>
-              <a:rPr lang="de-DE" sz="1100" dirty="0" smtClean="0"/>
+              <a:rPr lang="de-DE" sz="1100" dirty="0"/>
               <a:t> save (_</a:t>
             </a:r>
             <a:r>
-              <a:rPr lang="de-DE" sz="1100" dirty="0" err="1" smtClean="0"/>
+              <a:rPr lang="de-DE" sz="1100" dirty="0" err="1"/>
               <a:t>complete_preprocessing_A</a:t>
             </a:r>
             <a:r>
-              <a:rPr lang="de-DE" sz="1100" dirty="0" smtClean="0"/>
+              <a:rPr lang="de-DE" sz="1100" dirty="0"/>
               <a:t>/B);</a:t>
             </a:r>
           </a:p>
           <a:p>
             <a:r>
-              <a:rPr lang="de-DE" sz="1100" dirty="0" smtClean="0"/>
+              <a:rPr lang="de-DE" sz="1100" dirty="0"/>
               <a:t>Run </a:t>
             </a:r>
             <a:r>
-              <a:rPr lang="de-DE" sz="1100" dirty="0" err="1" smtClean="0"/>
+              <a:rPr lang="de-DE" sz="1100" dirty="0" err="1"/>
               <a:t>artifact</a:t>
             </a:r>
             <a:r>
-              <a:rPr lang="de-DE" sz="1100" dirty="0" smtClean="0"/>
-              <a:t> </a:t>
-            </a:r>
-            <a:r>
-              <a:rPr lang="de-DE" sz="1100" dirty="0" err="1" smtClean="0"/>
+              <a:rPr lang="de-DE" sz="1100" dirty="0"/>
+              <a:t> </a:t>
+            </a:r>
+            <a:r>
+              <a:rPr lang="de-DE" sz="1100" dirty="0" err="1"/>
               <a:t>rejection</a:t>
             </a:r>
             <a:r>
-              <a:rPr lang="de-DE" sz="1100" dirty="0" smtClean="0"/>
-              <a:t> </a:t>
-            </a:r>
-            <a:r>
-              <a:rPr lang="de-DE" sz="1100" dirty="0" err="1" smtClean="0"/>
+              <a:rPr lang="de-DE" sz="1100" dirty="0"/>
+              <a:t> </a:t>
+            </a:r>
+            <a:r>
+              <a:rPr lang="de-DE" sz="1100" dirty="0" err="1"/>
               <a:t>for</a:t>
             </a:r>
             <a:r>
-              <a:rPr lang="de-DE" sz="1100" dirty="0" smtClean="0"/>
+              <a:rPr lang="de-DE" sz="1100" dirty="0"/>
               <a:t> A </a:t>
             </a:r>
             <a:r>
-              <a:rPr lang="de-DE" sz="1100" dirty="0" err="1" smtClean="0"/>
+              <a:rPr lang="de-DE" sz="1100" dirty="0" err="1"/>
               <a:t>and</a:t>
             </a:r>
             <a:r>
-              <a:rPr lang="de-DE" sz="1100" dirty="0" smtClean="0"/>
+              <a:rPr lang="de-DE" sz="1100" dirty="0"/>
               <a:t> B </a:t>
             </a:r>
             <a:r>
-              <a:rPr lang="de-DE" sz="1100" dirty="0" err="1" smtClean="0"/>
+              <a:rPr lang="de-DE" sz="1100" dirty="0" err="1"/>
               <a:t>separately</a:t>
             </a:r>
             <a:r>
-              <a:rPr lang="de-DE" sz="1100" dirty="0" smtClean="0"/>
-              <a:t> </a:t>
-            </a:r>
-            <a:r>
-              <a:rPr lang="de-DE" sz="1100" dirty="0" err="1" smtClean="0"/>
+              <a:rPr lang="de-DE" sz="1100" dirty="0"/>
+              <a:t> </a:t>
+            </a:r>
+            <a:r>
+              <a:rPr lang="de-DE" sz="1100" dirty="0" err="1"/>
               <a:t>and</a:t>
             </a:r>
             <a:r>
-              <a:rPr lang="de-DE" sz="1100" dirty="0" smtClean="0"/>
+              <a:rPr lang="de-DE" sz="1100" dirty="0"/>
               <a:t> save (_</a:t>
             </a:r>
             <a:r>
-              <a:rPr lang="de-DE" sz="1100" dirty="0" err="1" smtClean="0"/>
+              <a:rPr lang="de-DE" sz="1100" dirty="0" err="1"/>
               <a:t>complete_preprocessing_withAR_A</a:t>
             </a:r>
             <a:r>
-              <a:rPr lang="de-DE" sz="1100" dirty="0" smtClean="0"/>
+              <a:rPr lang="de-DE" sz="1100" dirty="0"/>
               <a:t>/B)</a:t>
             </a:r>
           </a:p>
@@ -4698,7 +4724,7 @@
           <a:lstStyle/>
           <a:p>
             <a:r>
-              <a:rPr lang="de-DE" sz="1000" dirty="0" smtClean="0">
+              <a:rPr lang="de-DE" sz="1000" dirty="0">
                 <a:solidFill>
                   <a:srgbClr val="C00000"/>
                 </a:solidFill>
@@ -4706,7 +4732,7 @@
               <a:t>Redundant </a:t>
             </a:r>
             <a:r>
-              <a:rPr lang="de-DE" sz="1000" dirty="0" smtClean="0">
+              <a:rPr lang="de-DE" sz="1000" dirty="0">
                 <a:solidFill>
                   <a:srgbClr val="C00000"/>
                 </a:solidFill>
@@ -4759,7 +4785,7 @@
           <a:lstStyle/>
           <a:p>
             <a:r>
-              <a:rPr lang="de-DE" sz="1100" b="1" i="1" dirty="0" smtClean="0">
+              <a:rPr lang="de-DE" sz="1100" b="1" i="1" dirty="0">
                 <a:solidFill>
                   <a:schemeClr val="bg2">
                     <a:lumMod val="50000"/>
@@ -4771,7 +4797,7 @@
           </a:p>
           <a:p>
             <a:r>
-              <a:rPr lang="de-DE" sz="1100" dirty="0" smtClean="0">
+              <a:rPr lang="de-DE" sz="1100" dirty="0">
                 <a:solidFill>
                   <a:schemeClr val="bg2">
                     <a:lumMod val="50000"/>
@@ -4781,7 +4807,7 @@
               <a:t>Create </a:t>
             </a:r>
             <a:r>
-              <a:rPr lang="de-DE" sz="1100" dirty="0" err="1" smtClean="0">
+              <a:rPr lang="de-DE" sz="1100" dirty="0" err="1">
                 <a:solidFill>
                   <a:schemeClr val="bg2">
                     <a:lumMod val="50000"/>
@@ -4791,7 +4817,7 @@
               <a:t>epochs</a:t>
             </a:r>
             <a:r>
-              <a:rPr lang="de-DE" sz="1100" dirty="0" smtClean="0">
+              <a:rPr lang="de-DE" sz="1100" dirty="0">
                 <a:solidFill>
                   <a:schemeClr val="bg2">
                     <a:lumMod val="50000"/>
@@ -4801,7 +4827,7 @@
               <a:t> &amp; </a:t>
             </a:r>
             <a:r>
-              <a:rPr lang="de-DE" sz="1100" dirty="0" err="1" smtClean="0">
+              <a:rPr lang="de-DE" sz="1100" dirty="0" err="1">
                 <a:solidFill>
                   <a:schemeClr val="bg2">
                     <a:lumMod val="50000"/>
@@ -4811,7 +4837,7 @@
               <a:t>run</a:t>
             </a:r>
             <a:r>
-              <a:rPr lang="de-DE" sz="1100" dirty="0" smtClean="0">
+              <a:rPr lang="de-DE" sz="1100" dirty="0">
                 <a:solidFill>
                   <a:schemeClr val="bg2">
                     <a:lumMod val="50000"/>
@@ -4821,7 +4847,7 @@
               <a:t> </a:t>
             </a:r>
             <a:r>
-              <a:rPr lang="de-DE" sz="1100" dirty="0" err="1" smtClean="0">
+              <a:rPr lang="de-DE" sz="1100" dirty="0" err="1">
                 <a:solidFill>
                   <a:schemeClr val="bg2">
                     <a:lumMod val="50000"/>
@@ -4831,7 +4857,7 @@
               <a:t>baseline</a:t>
             </a:r>
             <a:r>
-              <a:rPr lang="de-DE" sz="1100" dirty="0" smtClean="0">
+              <a:rPr lang="de-DE" sz="1100" dirty="0">
                 <a:solidFill>
                   <a:schemeClr val="bg2">
                     <a:lumMod val="50000"/>
@@ -4841,7 +4867,7 @@
               <a:t> </a:t>
             </a:r>
             <a:r>
-              <a:rPr lang="de-DE" sz="1100" dirty="0" err="1" smtClean="0">
+              <a:rPr lang="de-DE" sz="1100" dirty="0" err="1">
                 <a:solidFill>
                   <a:schemeClr val="bg2">
                     <a:lumMod val="50000"/>
@@ -4851,7 +4877,7 @@
               <a:t>correction</a:t>
             </a:r>
             <a:r>
-              <a:rPr lang="de-DE" sz="1100" dirty="0" smtClean="0">
+              <a:rPr lang="de-DE" sz="1100" dirty="0">
                 <a:solidFill>
                   <a:schemeClr val="bg2">
                     <a:lumMod val="50000"/>
@@ -4861,7 +4887,7 @@
               <a:t>, save at </a:t>
             </a:r>
             <a:r>
-              <a:rPr lang="de-DE" sz="1100" dirty="0" err="1" smtClean="0">
+              <a:rPr lang="de-DE" sz="1100" dirty="0" err="1">
                 <a:solidFill>
                   <a:schemeClr val="bg2">
                     <a:lumMod val="50000"/>
@@ -4871,7 +4897,7 @@
               <a:t>every</a:t>
             </a:r>
             <a:r>
-              <a:rPr lang="de-DE" sz="1100" dirty="0" smtClean="0">
+              <a:rPr lang="de-DE" sz="1100" dirty="0">
                 <a:solidFill>
                   <a:schemeClr val="bg2">
                     <a:lumMod val="50000"/>
@@ -4881,7 +4907,7 @@
               <a:t> </a:t>
             </a:r>
             <a:r>
-              <a:rPr lang="de-DE" sz="1100" dirty="0" err="1" smtClean="0">
+              <a:rPr lang="de-DE" sz="1100" dirty="0" err="1">
                 <a:solidFill>
                   <a:schemeClr val="bg2">
                     <a:lumMod val="50000"/>
@@ -4890,7 +4916,7 @@
               </a:rPr>
               <a:t>step</a:t>
             </a:r>
-            <a:endParaRPr lang="de-DE" sz="1100" dirty="0" smtClean="0">
+            <a:endParaRPr lang="de-DE" sz="1100" dirty="0">
               <a:solidFill>
                 <a:schemeClr val="bg2">
                   <a:lumMod val="50000"/>
@@ -4923,7 +4949,7 @@
           <a:lstStyle/>
           <a:p>
             <a:r>
-              <a:rPr lang="de-DE" sz="1000" dirty="0" smtClean="0">
+              <a:rPr lang="de-DE" sz="1000" dirty="0">
                 <a:solidFill>
                   <a:srgbClr val="C00000"/>
                 </a:solidFill>
@@ -4931,7 +4957,7 @@
               <a:t>Redundant </a:t>
             </a:r>
             <a:r>
-              <a:rPr lang="de-DE" sz="1000" dirty="0" smtClean="0">
+              <a:rPr lang="de-DE" sz="1000" dirty="0">
                 <a:solidFill>
                   <a:srgbClr val="C00000"/>
                 </a:solidFill>
@@ -4957,13 +4983,1824 @@
   <p:clrMapOvr>
     <a:masterClrMapping/>
   </p:clrMapOvr>
-  <p:timing>
-    <p:tnLst>
-      <p:par>
-        <p:cTn id="1" dur="indefinite" restart="never" nodeType="tmRoot"/>
-      </p:par>
-    </p:tnLst>
-  </p:timing>
+</p:sld>
+</file>
+
+<file path=ppt/slides/slide2.xml><?xml version="1.0" encoding="utf-8"?>
+<p:sld xmlns:a="http://schemas.openxmlformats.org/drawingml/2006/main" xmlns:r="http://schemas.openxmlformats.org/officeDocument/2006/relationships" xmlns:p="http://schemas.openxmlformats.org/presentationml/2006/main">
+  <p:cSld>
+    <p:spTree>
+      <p:nvGrpSpPr>
+        <p:cNvPr id="1" name=""/>
+        <p:cNvGrpSpPr/>
+        <p:nvPr/>
+      </p:nvGrpSpPr>
+      <p:grpSpPr>
+        <a:xfrm>
+          <a:off x="0" y="0"/>
+          <a:ext cx="0" cy="0"/>
+          <a:chOff x="0" y="0"/>
+          <a:chExt cx="0" cy="0"/>
+        </a:xfrm>
+      </p:grpSpPr>
+      <p:sp>
+        <p:nvSpPr>
+          <p:cNvPr id="4" name="Rechteck 3"/>
+          <p:cNvSpPr/>
+          <p:nvPr/>
+        </p:nvSpPr>
+        <p:spPr>
+          <a:xfrm>
+            <a:off x="323849" y="531257"/>
+            <a:ext cx="3114675" cy="9006443"/>
+          </a:xfrm>
+          <a:prstGeom prst="rect">
+            <a:avLst/>
+          </a:prstGeom>
+          <a:solidFill>
+            <a:schemeClr val="accent4">
+              <a:lumMod val="20000"/>
+              <a:lumOff val="80000"/>
+            </a:schemeClr>
+          </a:solidFill>
+          <a:ln>
+            <a:noFill/>
+          </a:ln>
+        </p:spPr>
+        <p:style>
+          <a:lnRef idx="2">
+            <a:schemeClr val="accent1">
+              <a:shade val="50000"/>
+            </a:schemeClr>
+          </a:lnRef>
+          <a:fillRef idx="1">
+            <a:schemeClr val="accent1"/>
+          </a:fillRef>
+          <a:effectRef idx="0">
+            <a:schemeClr val="accent1"/>
+          </a:effectRef>
+          <a:fontRef idx="minor">
+            <a:schemeClr val="lt1"/>
+          </a:fontRef>
+        </p:style>
+        <p:txBody>
+          <a:bodyPr rtlCol="0" anchor="ctr"/>
+          <a:lstStyle/>
+          <a:p>
+            <a:pPr algn="ctr"/>
+            <a:endParaRPr lang="de-DE" dirty="0"/>
+          </a:p>
+        </p:txBody>
+      </p:sp>
+      <p:sp>
+        <p:nvSpPr>
+          <p:cNvPr id="5" name="Rechteck 4"/>
+          <p:cNvSpPr/>
+          <p:nvPr/>
+        </p:nvSpPr>
+        <p:spPr>
+          <a:xfrm>
+            <a:off x="3438523" y="531257"/>
+            <a:ext cx="3057526" cy="9006443"/>
+          </a:xfrm>
+          <a:prstGeom prst="rect">
+            <a:avLst/>
+          </a:prstGeom>
+          <a:solidFill>
+            <a:schemeClr val="accent6">
+              <a:lumMod val="20000"/>
+              <a:lumOff val="80000"/>
+            </a:schemeClr>
+          </a:solidFill>
+          <a:ln>
+            <a:noFill/>
+          </a:ln>
+        </p:spPr>
+        <p:style>
+          <a:lnRef idx="2">
+            <a:schemeClr val="accent1">
+              <a:shade val="50000"/>
+            </a:schemeClr>
+          </a:lnRef>
+          <a:fillRef idx="1">
+            <a:schemeClr val="accent1"/>
+          </a:fillRef>
+          <a:effectRef idx="0">
+            <a:schemeClr val="accent1"/>
+          </a:effectRef>
+          <a:fontRef idx="minor">
+            <a:schemeClr val="lt1"/>
+          </a:fontRef>
+        </p:style>
+        <p:txBody>
+          <a:bodyPr rtlCol="0" anchor="ctr"/>
+          <a:lstStyle/>
+          <a:p>
+            <a:pPr algn="ctr"/>
+            <a:endParaRPr lang="de-DE"/>
+          </a:p>
+        </p:txBody>
+      </p:sp>
+      <p:sp>
+        <p:nvSpPr>
+          <p:cNvPr id="6" name="Textfeld 5"/>
+          <p:cNvSpPr txBox="1"/>
+          <p:nvPr/>
+        </p:nvSpPr>
+        <p:spPr>
+          <a:xfrm>
+            <a:off x="323850" y="161925"/>
+            <a:ext cx="1609725" cy="369332"/>
+          </a:xfrm>
+          <a:prstGeom prst="rect">
+            <a:avLst/>
+          </a:prstGeom>
+          <a:noFill/>
+        </p:spPr>
+        <p:txBody>
+          <a:bodyPr wrap="square" rtlCol="0">
+            <a:spAutoFit/>
+          </a:bodyPr>
+          <a:lstStyle/>
+          <a:p>
+            <a:r>
+              <a:rPr lang="de-DE" dirty="0"/>
+              <a:t>Task A</a:t>
+            </a:r>
+          </a:p>
+        </p:txBody>
+      </p:sp>
+      <p:sp>
+        <p:nvSpPr>
+          <p:cNvPr id="7" name="Textfeld 6"/>
+          <p:cNvSpPr txBox="1"/>
+          <p:nvPr/>
+        </p:nvSpPr>
+        <p:spPr>
+          <a:xfrm>
+            <a:off x="3762375" y="184666"/>
+            <a:ext cx="1609725" cy="369332"/>
+          </a:xfrm>
+          <a:prstGeom prst="rect">
+            <a:avLst/>
+          </a:prstGeom>
+          <a:noFill/>
+        </p:spPr>
+        <p:txBody>
+          <a:bodyPr wrap="square" rtlCol="0">
+            <a:spAutoFit/>
+          </a:bodyPr>
+          <a:lstStyle/>
+          <a:p>
+            <a:r>
+              <a:rPr lang="de-DE" dirty="0"/>
+              <a:t>Task B</a:t>
+            </a:r>
+          </a:p>
+        </p:txBody>
+      </p:sp>
+      <p:sp>
+        <p:nvSpPr>
+          <p:cNvPr id="8" name="Textfeld 7"/>
+          <p:cNvSpPr txBox="1"/>
+          <p:nvPr/>
+        </p:nvSpPr>
+        <p:spPr>
+          <a:xfrm>
+            <a:off x="442910" y="886528"/>
+            <a:ext cx="2876550" cy="938719"/>
+          </a:xfrm>
+          <a:prstGeom prst="rect">
+            <a:avLst/>
+          </a:prstGeom>
+          <a:noFill/>
+        </p:spPr>
+        <p:style>
+          <a:lnRef idx="2">
+            <a:schemeClr val="dk1"/>
+          </a:lnRef>
+          <a:fillRef idx="1">
+            <a:schemeClr val="lt1"/>
+          </a:fillRef>
+          <a:effectRef idx="0">
+            <a:schemeClr val="dk1"/>
+          </a:effectRef>
+          <a:fontRef idx="minor">
+            <a:schemeClr val="dk1"/>
+          </a:fontRef>
+        </p:style>
+        <p:txBody>
+          <a:bodyPr wrap="square" rtlCol="0">
+            <a:spAutoFit/>
+          </a:bodyPr>
+          <a:lstStyle/>
+          <a:p>
+            <a:r>
+              <a:rPr lang="de-DE" sz="1100" b="1" i="1" dirty="0"/>
+              <a:t>tracking_1_readdata_preprocessing_new.m</a:t>
+            </a:r>
+          </a:p>
+          <a:p>
+            <a:r>
+              <a:rPr lang="de-DE" sz="1100" dirty="0"/>
+              <a:t>Read </a:t>
+            </a:r>
+            <a:r>
+              <a:rPr lang="de-DE" sz="1100" dirty="0" err="1"/>
+              <a:t>raw</a:t>
+            </a:r>
+            <a:r>
+              <a:rPr lang="de-DE" sz="1100" dirty="0"/>
+              <a:t> EEG </a:t>
+            </a:r>
+            <a:r>
+              <a:rPr lang="de-DE" sz="1100" dirty="0" err="1"/>
+              <a:t>data</a:t>
+            </a:r>
+            <a:r>
+              <a:rPr lang="de-DE" sz="1100" dirty="0"/>
+              <a:t>, </a:t>
+            </a:r>
+            <a:r>
+              <a:rPr lang="de-DE" sz="1100" dirty="0" err="1"/>
+              <a:t>first</a:t>
+            </a:r>
+            <a:r>
+              <a:rPr lang="de-DE" sz="1100" dirty="0"/>
+              <a:t> </a:t>
+            </a:r>
+            <a:r>
+              <a:rPr lang="de-DE" sz="1100" dirty="0" err="1"/>
+              <a:t>preprocessing</a:t>
+            </a:r>
+            <a:r>
+              <a:rPr lang="de-DE" sz="1100" dirty="0"/>
+              <a:t> </a:t>
+            </a:r>
+            <a:r>
+              <a:rPr lang="de-DE" sz="1100" dirty="0" err="1"/>
+              <a:t>steps</a:t>
+            </a:r>
+            <a:r>
+              <a:rPr lang="de-DE" sz="1100" dirty="0"/>
+              <a:t> (</a:t>
+            </a:r>
+            <a:r>
+              <a:rPr lang="de-DE" sz="1100" dirty="0" err="1"/>
+              <a:t>filters</a:t>
+            </a:r>
+            <a:r>
+              <a:rPr lang="de-DE" sz="1100" dirty="0"/>
+              <a:t>, </a:t>
+            </a:r>
+            <a:r>
+              <a:rPr lang="de-DE" sz="1100" dirty="0" err="1"/>
+              <a:t>downsampling</a:t>
+            </a:r>
+            <a:r>
+              <a:rPr lang="de-DE" sz="1100" dirty="0"/>
+              <a:t>, </a:t>
+            </a:r>
+            <a:r>
+              <a:rPr lang="de-DE" sz="1100" dirty="0" err="1"/>
+              <a:t>rereferencing</a:t>
+            </a:r>
+            <a:r>
+              <a:rPr lang="de-DE" sz="1100" dirty="0"/>
+              <a:t> etc.)</a:t>
+            </a:r>
+          </a:p>
+          <a:p>
+            <a:r>
+              <a:rPr lang="de-DE" sz="1100" dirty="0"/>
+              <a:t>+ </a:t>
+            </a:r>
+            <a:r>
+              <a:rPr lang="de-DE" sz="1100" dirty="0" err="1"/>
+              <a:t>export</a:t>
+            </a:r>
+            <a:r>
+              <a:rPr lang="de-DE" sz="1100" dirty="0"/>
+              <a:t> in EEGLAB </a:t>
+            </a:r>
+            <a:r>
+              <a:rPr lang="de-DE" sz="1100" dirty="0" err="1"/>
+              <a:t>structure</a:t>
+            </a:r>
+            <a:r>
+              <a:rPr lang="de-DE" sz="1100" dirty="0"/>
+              <a:t> </a:t>
+            </a:r>
+            <a:r>
+              <a:rPr lang="de-DE" sz="1100" dirty="0" err="1"/>
+              <a:t>as</a:t>
+            </a:r>
+            <a:r>
+              <a:rPr lang="de-DE" sz="1100" dirty="0"/>
+              <a:t> </a:t>
+            </a:r>
+            <a:r>
+              <a:rPr lang="de-DE" sz="1100" dirty="0" err="1"/>
+              <a:t>continuous</a:t>
+            </a:r>
+            <a:r>
+              <a:rPr lang="de-DE" sz="1100" dirty="0"/>
+              <a:t> </a:t>
+            </a:r>
+            <a:r>
+              <a:rPr lang="de-DE" sz="1100" dirty="0" err="1"/>
+              <a:t>data</a:t>
+            </a:r>
+            <a:endParaRPr lang="de-DE" sz="1100" dirty="0"/>
+          </a:p>
+        </p:txBody>
+      </p:sp>
+      <p:sp>
+        <p:nvSpPr>
+          <p:cNvPr id="9" name="Textfeld 8"/>
+          <p:cNvSpPr txBox="1"/>
+          <p:nvPr/>
+        </p:nvSpPr>
+        <p:spPr>
+          <a:xfrm>
+            <a:off x="3557585" y="824675"/>
+            <a:ext cx="2867023" cy="1107996"/>
+          </a:xfrm>
+          <a:prstGeom prst="rect">
+            <a:avLst/>
+          </a:prstGeom>
+          <a:noFill/>
+        </p:spPr>
+        <p:style>
+          <a:lnRef idx="2">
+            <a:schemeClr val="dk1"/>
+          </a:lnRef>
+          <a:fillRef idx="1">
+            <a:schemeClr val="lt1"/>
+          </a:fillRef>
+          <a:effectRef idx="0">
+            <a:schemeClr val="dk1"/>
+          </a:effectRef>
+          <a:fontRef idx="minor">
+            <a:schemeClr val="dk1"/>
+          </a:fontRef>
+        </p:style>
+        <p:txBody>
+          <a:bodyPr wrap="square" rtlCol="0">
+            <a:spAutoFit/>
+          </a:bodyPr>
+          <a:lstStyle/>
+          <a:p>
+            <a:r>
+              <a:rPr lang="de-DE" sz="1100" b="1" i="1" dirty="0"/>
+              <a:t>tracking_occlusion_1_readdata_preprocessing_new.m</a:t>
+            </a:r>
+          </a:p>
+          <a:p>
+            <a:r>
+              <a:rPr lang="de-DE" sz="1100" dirty="0"/>
+              <a:t>Read </a:t>
+            </a:r>
+            <a:r>
+              <a:rPr lang="de-DE" sz="1100" dirty="0" err="1"/>
+              <a:t>raw</a:t>
+            </a:r>
+            <a:r>
+              <a:rPr lang="de-DE" sz="1100" dirty="0"/>
+              <a:t> EEG </a:t>
+            </a:r>
+            <a:r>
+              <a:rPr lang="de-DE" sz="1100" dirty="0" err="1"/>
+              <a:t>data</a:t>
+            </a:r>
+            <a:r>
+              <a:rPr lang="de-DE" sz="1100" dirty="0"/>
+              <a:t>, </a:t>
+            </a:r>
+            <a:r>
+              <a:rPr lang="de-DE" sz="1100" dirty="0" err="1"/>
+              <a:t>first</a:t>
+            </a:r>
+            <a:r>
+              <a:rPr lang="de-DE" sz="1100" dirty="0"/>
+              <a:t> </a:t>
+            </a:r>
+            <a:r>
+              <a:rPr lang="de-DE" sz="1100" dirty="0" err="1"/>
+              <a:t>preprocessing</a:t>
+            </a:r>
+            <a:r>
+              <a:rPr lang="de-DE" sz="1100" dirty="0"/>
+              <a:t> </a:t>
+            </a:r>
+            <a:r>
+              <a:rPr lang="de-DE" sz="1100" dirty="0" err="1"/>
+              <a:t>steps</a:t>
+            </a:r>
+            <a:r>
+              <a:rPr lang="de-DE" sz="1100" dirty="0"/>
+              <a:t> (</a:t>
+            </a:r>
+            <a:r>
+              <a:rPr lang="de-DE" sz="1100" dirty="0" err="1"/>
+              <a:t>filters</a:t>
+            </a:r>
+            <a:r>
+              <a:rPr lang="de-DE" sz="1100" dirty="0"/>
+              <a:t>, </a:t>
+            </a:r>
+            <a:r>
+              <a:rPr lang="de-DE" sz="1100" dirty="0" err="1"/>
+              <a:t>downsampling</a:t>
+            </a:r>
+            <a:r>
+              <a:rPr lang="de-DE" sz="1100" dirty="0"/>
+              <a:t>, </a:t>
+            </a:r>
+            <a:r>
+              <a:rPr lang="de-DE" sz="1100" dirty="0" err="1"/>
+              <a:t>rereferencing</a:t>
+            </a:r>
+            <a:r>
+              <a:rPr lang="de-DE" sz="1100" dirty="0"/>
+              <a:t> etc.)</a:t>
+            </a:r>
+          </a:p>
+          <a:p>
+            <a:r>
+              <a:rPr lang="de-DE" sz="1100" dirty="0"/>
+              <a:t>+ </a:t>
+            </a:r>
+            <a:r>
+              <a:rPr lang="de-DE" sz="1100" dirty="0" err="1"/>
+              <a:t>export</a:t>
+            </a:r>
+            <a:r>
+              <a:rPr lang="de-DE" sz="1100" dirty="0"/>
+              <a:t> in EEGLAB </a:t>
+            </a:r>
+            <a:r>
+              <a:rPr lang="de-DE" sz="1100" dirty="0" err="1"/>
+              <a:t>structure</a:t>
+            </a:r>
+            <a:r>
+              <a:rPr lang="de-DE" sz="1100" dirty="0"/>
+              <a:t> </a:t>
+            </a:r>
+            <a:r>
+              <a:rPr lang="de-DE" sz="1100" dirty="0" err="1"/>
+              <a:t>as</a:t>
+            </a:r>
+            <a:r>
+              <a:rPr lang="de-DE" sz="1100" dirty="0"/>
+              <a:t> </a:t>
+            </a:r>
+            <a:r>
+              <a:rPr lang="de-DE" sz="1100" dirty="0" err="1"/>
+              <a:t>continuous</a:t>
+            </a:r>
+            <a:r>
+              <a:rPr lang="de-DE" sz="1100" dirty="0"/>
+              <a:t> </a:t>
+            </a:r>
+            <a:r>
+              <a:rPr lang="de-DE" sz="1100" dirty="0" err="1"/>
+              <a:t>data</a:t>
+            </a:r>
+            <a:endParaRPr lang="de-DE" sz="1100" dirty="0"/>
+          </a:p>
+        </p:txBody>
+      </p:sp>
+      <p:sp>
+        <p:nvSpPr>
+          <p:cNvPr id="10" name="Textfeld 9"/>
+          <p:cNvSpPr txBox="1"/>
+          <p:nvPr/>
+        </p:nvSpPr>
+        <p:spPr>
+          <a:xfrm>
+            <a:off x="2000247" y="2119712"/>
+            <a:ext cx="2876550" cy="938719"/>
+          </a:xfrm>
+          <a:prstGeom prst="rect">
+            <a:avLst/>
+          </a:prstGeom>
+          <a:noFill/>
+        </p:spPr>
+        <p:style>
+          <a:lnRef idx="2">
+            <a:schemeClr val="dk1"/>
+          </a:lnRef>
+          <a:fillRef idx="1">
+            <a:schemeClr val="lt1"/>
+          </a:fillRef>
+          <a:effectRef idx="0">
+            <a:schemeClr val="dk1"/>
+          </a:effectRef>
+          <a:fontRef idx="minor">
+            <a:schemeClr val="dk1"/>
+          </a:fontRef>
+        </p:style>
+        <p:txBody>
+          <a:bodyPr wrap="square" rtlCol="0">
+            <a:spAutoFit/>
+          </a:bodyPr>
+          <a:lstStyle/>
+          <a:p>
+            <a:r>
+              <a:rPr lang="de-DE" sz="1100" b="1" i="1" dirty="0"/>
+              <a:t>tracking_2_combined_ICA.m</a:t>
+            </a:r>
+          </a:p>
+          <a:p>
+            <a:r>
+              <a:rPr lang="de-DE" sz="1100" dirty="0"/>
+              <a:t>Read </a:t>
+            </a:r>
+            <a:r>
+              <a:rPr lang="de-DE" sz="1100" dirty="0" err="1"/>
+              <a:t>preprocessed</a:t>
+            </a:r>
+            <a:r>
+              <a:rPr lang="de-DE" sz="1100" dirty="0"/>
+              <a:t> EEGLAB </a:t>
+            </a:r>
+            <a:r>
+              <a:rPr lang="de-DE" sz="1100" dirty="0" err="1"/>
+              <a:t>data</a:t>
+            </a:r>
+            <a:r>
+              <a:rPr lang="de-DE" sz="1100" dirty="0"/>
+              <a:t> </a:t>
+            </a:r>
+            <a:r>
+              <a:rPr lang="de-DE" sz="1100" dirty="0" err="1"/>
+              <a:t>for</a:t>
+            </a:r>
+            <a:r>
+              <a:rPr lang="de-DE" sz="1100" dirty="0"/>
+              <a:t> </a:t>
+            </a:r>
+            <a:r>
+              <a:rPr lang="de-DE" sz="1100" dirty="0" err="1"/>
+              <a:t>task</a:t>
+            </a:r>
+            <a:r>
+              <a:rPr lang="de-DE" sz="1100" dirty="0"/>
+              <a:t> A </a:t>
+            </a:r>
+            <a:r>
+              <a:rPr lang="de-DE" sz="1100" dirty="0" err="1"/>
+              <a:t>and</a:t>
+            </a:r>
+            <a:r>
+              <a:rPr lang="de-DE" sz="1100" dirty="0"/>
+              <a:t> B; </a:t>
+            </a:r>
+            <a:r>
+              <a:rPr lang="de-DE" sz="1100" dirty="0" err="1"/>
+              <a:t>merge</a:t>
+            </a:r>
+            <a:r>
+              <a:rPr lang="de-DE" sz="1100" dirty="0"/>
+              <a:t> </a:t>
+            </a:r>
+            <a:r>
+              <a:rPr lang="de-DE" sz="1100" dirty="0" err="1"/>
+              <a:t>continuous</a:t>
+            </a:r>
+            <a:r>
+              <a:rPr lang="de-DE" sz="1100" dirty="0"/>
+              <a:t> </a:t>
+            </a:r>
+            <a:r>
+              <a:rPr lang="de-DE" sz="1100" dirty="0" err="1"/>
+              <a:t>data</a:t>
+            </a:r>
+            <a:r>
+              <a:rPr lang="de-DE" sz="1100" dirty="0"/>
+              <a:t> </a:t>
+            </a:r>
+            <a:r>
+              <a:rPr lang="de-DE" sz="1100" dirty="0" err="1"/>
+              <a:t>sets</a:t>
+            </a:r>
+            <a:r>
+              <a:rPr lang="de-DE" sz="1100" dirty="0"/>
+              <a:t>; </a:t>
+            </a:r>
+            <a:r>
+              <a:rPr lang="de-DE" sz="1100" dirty="0" err="1"/>
+              <a:t>run</a:t>
+            </a:r>
+            <a:r>
+              <a:rPr lang="de-DE" sz="1100" dirty="0"/>
+              <a:t> ICA on </a:t>
+            </a:r>
+            <a:r>
+              <a:rPr lang="de-DE" sz="1100" dirty="0" err="1"/>
+              <a:t>merged</a:t>
+            </a:r>
+            <a:r>
+              <a:rPr lang="de-DE" sz="1100" dirty="0"/>
+              <a:t> </a:t>
+            </a:r>
+            <a:r>
+              <a:rPr lang="de-DE" sz="1100" dirty="0" err="1"/>
+              <a:t>data</a:t>
+            </a:r>
+            <a:r>
+              <a:rPr lang="de-DE" sz="1100" dirty="0"/>
+              <a:t> </a:t>
+            </a:r>
+            <a:r>
+              <a:rPr lang="de-DE" sz="1100" dirty="0" err="1"/>
+              <a:t>and</a:t>
+            </a:r>
+            <a:r>
+              <a:rPr lang="de-DE" sz="1100" dirty="0"/>
+              <a:t> save </a:t>
+            </a:r>
+            <a:r>
+              <a:rPr lang="de-DE" sz="1100" dirty="0" err="1"/>
+              <a:t>merged</a:t>
+            </a:r>
+            <a:r>
+              <a:rPr lang="de-DE" sz="1100" dirty="0"/>
+              <a:t> </a:t>
+            </a:r>
+            <a:r>
+              <a:rPr lang="de-DE" sz="1100" dirty="0" err="1"/>
+              <a:t>data</a:t>
+            </a:r>
+            <a:r>
+              <a:rPr lang="de-DE" sz="1100" dirty="0"/>
+              <a:t> </a:t>
+            </a:r>
+            <a:r>
+              <a:rPr lang="de-DE" sz="1100" dirty="0" err="1"/>
+              <a:t>with</a:t>
+            </a:r>
+            <a:r>
+              <a:rPr lang="de-DE" sz="1100" dirty="0"/>
+              <a:t> </a:t>
+            </a:r>
+            <a:r>
+              <a:rPr lang="de-DE" sz="1100" dirty="0" err="1"/>
+              <a:t>Ics</a:t>
+            </a:r>
+            <a:r>
+              <a:rPr lang="de-DE" sz="1100" dirty="0"/>
+              <a:t> (_</a:t>
+            </a:r>
+            <a:r>
+              <a:rPr lang="de-DE" sz="1100" dirty="0" err="1"/>
+              <a:t>ICA_merged_new</a:t>
+            </a:r>
+            <a:r>
+              <a:rPr lang="de-DE" sz="1100" dirty="0"/>
+              <a:t>)</a:t>
+            </a:r>
+          </a:p>
+        </p:txBody>
+      </p:sp>
+      <p:sp>
+        <p:nvSpPr>
+          <p:cNvPr id="12" name="Textfeld 11"/>
+          <p:cNvSpPr txBox="1"/>
+          <p:nvPr/>
+        </p:nvSpPr>
+        <p:spPr>
+          <a:xfrm>
+            <a:off x="1881185" y="3245472"/>
+            <a:ext cx="3148012" cy="2123658"/>
+          </a:xfrm>
+          <a:prstGeom prst="rect">
+            <a:avLst/>
+          </a:prstGeom>
+          <a:noFill/>
+        </p:spPr>
+        <p:style>
+          <a:lnRef idx="2">
+            <a:schemeClr val="dk1"/>
+          </a:lnRef>
+          <a:fillRef idx="1">
+            <a:schemeClr val="lt1"/>
+          </a:fillRef>
+          <a:effectRef idx="0">
+            <a:schemeClr val="dk1"/>
+          </a:effectRef>
+          <a:fontRef idx="minor">
+            <a:schemeClr val="dk1"/>
+          </a:fontRef>
+        </p:style>
+        <p:txBody>
+          <a:bodyPr wrap="square" rtlCol="0">
+            <a:spAutoFit/>
+          </a:bodyPr>
+          <a:lstStyle/>
+          <a:p>
+            <a:r>
+              <a:rPr lang="de-DE" sz="1100" b="1" i="1" dirty="0"/>
+              <a:t>tracking_3_merged_Iclabel_separate.m</a:t>
+            </a:r>
+          </a:p>
+          <a:p>
+            <a:r>
+              <a:rPr lang="de-DE" sz="1100" dirty="0"/>
+              <a:t>Run </a:t>
+            </a:r>
+            <a:r>
+              <a:rPr lang="de-DE" sz="1100" dirty="0" err="1"/>
+              <a:t>Iclabel</a:t>
+            </a:r>
+            <a:r>
+              <a:rPr lang="de-DE" sz="1100" dirty="0"/>
+              <a:t> on </a:t>
+            </a:r>
+            <a:r>
+              <a:rPr lang="de-DE" sz="1100" dirty="0" err="1"/>
+              <a:t>merged</a:t>
+            </a:r>
+            <a:r>
+              <a:rPr lang="de-DE" sz="1100" dirty="0"/>
+              <a:t> </a:t>
+            </a:r>
+            <a:r>
+              <a:rPr lang="de-DE" sz="1100" dirty="0" err="1"/>
+              <a:t>continuous</a:t>
+            </a:r>
+            <a:r>
+              <a:rPr lang="de-DE" sz="1100" dirty="0"/>
+              <a:t> </a:t>
+            </a:r>
+            <a:r>
+              <a:rPr lang="de-DE" sz="1100" dirty="0" err="1"/>
+              <a:t>data</a:t>
+            </a:r>
+            <a:r>
+              <a:rPr lang="de-DE" sz="1100" dirty="0"/>
+              <a:t> </a:t>
+            </a:r>
+            <a:r>
+              <a:rPr lang="de-DE" sz="1100" dirty="0" err="1"/>
+              <a:t>with</a:t>
+            </a:r>
+            <a:r>
+              <a:rPr lang="de-DE" sz="1100" dirty="0"/>
+              <a:t> </a:t>
+            </a:r>
+            <a:r>
+              <a:rPr lang="de-DE" sz="1100" dirty="0" err="1"/>
+              <a:t>Ics</a:t>
+            </a:r>
+            <a:r>
+              <a:rPr lang="de-DE" sz="1100" dirty="0"/>
+              <a:t>, </a:t>
+            </a:r>
+            <a:r>
+              <a:rPr lang="de-DE" sz="1100" dirty="0" err="1"/>
+              <a:t>exclude</a:t>
+            </a:r>
+            <a:r>
+              <a:rPr lang="de-DE" sz="1100" dirty="0"/>
+              <a:t> all non-</a:t>
+            </a:r>
+            <a:r>
+              <a:rPr lang="de-DE" sz="1100" dirty="0" err="1"/>
+              <a:t>brain</a:t>
+            </a:r>
+            <a:r>
+              <a:rPr lang="de-DE" sz="1100" dirty="0"/>
+              <a:t> </a:t>
+            </a:r>
+            <a:r>
+              <a:rPr lang="de-DE" sz="1100" dirty="0" err="1"/>
+              <a:t>components</a:t>
+            </a:r>
+            <a:r>
+              <a:rPr lang="de-DE" sz="1100" dirty="0"/>
+              <a:t> + </a:t>
+            </a:r>
+            <a:r>
+              <a:rPr lang="de-DE" sz="1100" dirty="0" err="1"/>
+              <a:t>run</a:t>
+            </a:r>
+            <a:r>
+              <a:rPr lang="de-DE" sz="1100" dirty="0"/>
+              <a:t> </a:t>
+            </a:r>
+            <a:r>
+              <a:rPr lang="de-DE" sz="1100" dirty="0" err="1"/>
+              <a:t>visual</a:t>
+            </a:r>
+            <a:r>
+              <a:rPr lang="de-DE" sz="1100" dirty="0"/>
+              <a:t> check </a:t>
+            </a:r>
+            <a:r>
+              <a:rPr lang="de-DE" sz="1100" dirty="0" err="1"/>
+              <a:t>of</a:t>
+            </a:r>
+            <a:r>
+              <a:rPr lang="de-DE" sz="1100" dirty="0"/>
+              <a:t> </a:t>
+            </a:r>
+            <a:r>
+              <a:rPr lang="de-DE" sz="1100" dirty="0" err="1"/>
+              <a:t>first</a:t>
+            </a:r>
+            <a:r>
+              <a:rPr lang="de-DE" sz="1100" dirty="0"/>
+              <a:t> 5 </a:t>
+            </a:r>
+            <a:r>
+              <a:rPr lang="de-DE" sz="1100" dirty="0" err="1"/>
+              <a:t>remaining</a:t>
+            </a:r>
+            <a:r>
+              <a:rPr lang="de-DE" sz="1100" dirty="0"/>
+              <a:t> </a:t>
+            </a:r>
+            <a:r>
+              <a:rPr lang="de-DE" sz="1100" dirty="0" err="1"/>
+              <a:t>components</a:t>
+            </a:r>
+            <a:r>
+              <a:rPr lang="de-DE" sz="1100" dirty="0"/>
+              <a:t>, save </a:t>
+            </a:r>
+            <a:r>
+              <a:rPr lang="de-DE" sz="1100" dirty="0" err="1"/>
+              <a:t>excluded</a:t>
+            </a:r>
+            <a:r>
+              <a:rPr lang="de-DE" sz="1100" dirty="0"/>
+              <a:t> </a:t>
+            </a:r>
+            <a:r>
+              <a:rPr lang="de-DE" sz="1100" dirty="0" err="1"/>
+              <a:t>Ics</a:t>
+            </a:r>
+            <a:r>
+              <a:rPr lang="de-DE" sz="1100" dirty="0"/>
+              <a:t> in </a:t>
+            </a:r>
+            <a:r>
+              <a:rPr lang="de-DE" sz="1100" dirty="0" err="1"/>
+              <a:t>structure</a:t>
+            </a:r>
+            <a:r>
+              <a:rPr lang="de-DE" sz="1100" dirty="0"/>
+              <a:t> </a:t>
+            </a:r>
+            <a:r>
+              <a:rPr lang="de-DE" sz="1100" dirty="0" err="1"/>
+              <a:t>and</a:t>
+            </a:r>
+            <a:r>
+              <a:rPr lang="de-DE" sz="1100" dirty="0"/>
+              <a:t> save </a:t>
+            </a:r>
+            <a:r>
+              <a:rPr lang="de-DE" sz="1100" dirty="0" err="1"/>
+              <a:t>merged</a:t>
+            </a:r>
+            <a:r>
+              <a:rPr lang="de-DE" sz="1100" dirty="0"/>
+              <a:t> </a:t>
+            </a:r>
+            <a:r>
+              <a:rPr lang="de-DE" sz="1100" dirty="0" err="1"/>
+              <a:t>continuous</a:t>
+            </a:r>
+            <a:r>
+              <a:rPr lang="de-DE" sz="1100" dirty="0"/>
+              <a:t> </a:t>
+            </a:r>
+            <a:r>
+              <a:rPr lang="de-DE" sz="1100" dirty="0" err="1"/>
+              <a:t>data</a:t>
+            </a:r>
+            <a:r>
+              <a:rPr lang="de-DE" sz="1100" dirty="0"/>
+              <a:t> </a:t>
+            </a:r>
+            <a:r>
+              <a:rPr lang="de-DE" sz="1100" dirty="0" err="1"/>
+              <a:t>cleaned</a:t>
+            </a:r>
+            <a:r>
+              <a:rPr lang="de-DE" sz="1100" dirty="0"/>
+              <a:t> </a:t>
+            </a:r>
+            <a:r>
+              <a:rPr lang="de-DE" sz="1100" dirty="0" err="1"/>
+              <a:t>from</a:t>
+            </a:r>
+            <a:r>
+              <a:rPr lang="de-DE" sz="1100" dirty="0"/>
+              <a:t> non-</a:t>
+            </a:r>
+            <a:r>
+              <a:rPr lang="de-DE" sz="1100" dirty="0" err="1"/>
+              <a:t>brain</a:t>
+            </a:r>
+            <a:r>
+              <a:rPr lang="de-DE" sz="1100" dirty="0"/>
+              <a:t> </a:t>
+            </a:r>
+            <a:r>
+              <a:rPr lang="de-DE" sz="1100" dirty="0" err="1"/>
+              <a:t>signals</a:t>
+            </a:r>
+            <a:r>
+              <a:rPr lang="de-DE" sz="1100" dirty="0"/>
+              <a:t> (-</a:t>
+            </a:r>
+            <a:r>
+              <a:rPr lang="de-DE" sz="1100" dirty="0" err="1"/>
+              <a:t>icaclean</a:t>
+            </a:r>
+            <a:r>
+              <a:rPr lang="de-DE" sz="1100" dirty="0"/>
+              <a:t>);</a:t>
+            </a:r>
+          </a:p>
+          <a:p>
+            <a:r>
+              <a:rPr lang="de-DE" sz="1100" strike="sngStrike" dirty="0"/>
+              <a:t>Create </a:t>
+            </a:r>
+            <a:r>
+              <a:rPr lang="de-DE" sz="1100" strike="sngStrike" dirty="0" err="1"/>
+              <a:t>epochs</a:t>
+            </a:r>
+            <a:r>
+              <a:rPr lang="de-DE" sz="1100" strike="sngStrike" dirty="0"/>
+              <a:t> A </a:t>
+            </a:r>
+            <a:r>
+              <a:rPr lang="de-DE" sz="1100" strike="sngStrike" dirty="0" err="1"/>
+              <a:t>and</a:t>
+            </a:r>
+            <a:r>
+              <a:rPr lang="de-DE" sz="1100" strike="sngStrike" dirty="0"/>
+              <a:t> B </a:t>
+            </a:r>
+            <a:r>
+              <a:rPr lang="de-DE" sz="1100" strike="sngStrike" dirty="0" err="1"/>
+              <a:t>events</a:t>
+            </a:r>
+            <a:r>
+              <a:rPr lang="de-DE" sz="1100" strike="sngStrike" dirty="0"/>
+              <a:t>, save </a:t>
+            </a:r>
+            <a:r>
+              <a:rPr lang="de-DE" sz="1100" strike="sngStrike" dirty="0" err="1"/>
+              <a:t>epoched</a:t>
+            </a:r>
+            <a:r>
+              <a:rPr lang="de-DE" sz="1100" strike="sngStrike" dirty="0"/>
+              <a:t> </a:t>
+            </a:r>
+            <a:r>
+              <a:rPr lang="de-DE" sz="1100" strike="sngStrike" dirty="0" err="1"/>
+              <a:t>data</a:t>
+            </a:r>
+            <a:r>
+              <a:rPr lang="de-DE" sz="1100" strike="sngStrike" dirty="0"/>
+              <a:t> (_</a:t>
+            </a:r>
+            <a:r>
+              <a:rPr lang="de-DE" sz="1100" strike="sngStrike" dirty="0" err="1"/>
+              <a:t>icaclean_epoched_A</a:t>
+            </a:r>
+            <a:r>
+              <a:rPr lang="de-DE" sz="1100" strike="sngStrike" dirty="0"/>
+              <a:t>/B);</a:t>
+            </a:r>
+          </a:p>
+          <a:p>
+            <a:r>
+              <a:rPr lang="de-DE" sz="1100" strike="sngStrike" dirty="0"/>
+              <a:t>Remove </a:t>
+            </a:r>
+            <a:r>
+              <a:rPr lang="de-DE" sz="1100" strike="sngStrike" dirty="0" err="1"/>
+              <a:t>baseline</a:t>
+            </a:r>
+            <a:r>
+              <a:rPr lang="de-DE" sz="1100" strike="sngStrike" dirty="0"/>
+              <a:t> </a:t>
+            </a:r>
+            <a:r>
+              <a:rPr lang="de-DE" sz="1100" strike="sngStrike" dirty="0" err="1"/>
+              <a:t>for</a:t>
+            </a:r>
+            <a:r>
+              <a:rPr lang="de-DE" sz="1100" strike="sngStrike" dirty="0"/>
+              <a:t> A </a:t>
+            </a:r>
+            <a:r>
+              <a:rPr lang="de-DE" sz="1100" strike="sngStrike" dirty="0" err="1"/>
+              <a:t>and</a:t>
+            </a:r>
+            <a:r>
+              <a:rPr lang="de-DE" sz="1100" strike="sngStrike" dirty="0"/>
+              <a:t> B </a:t>
+            </a:r>
+            <a:r>
+              <a:rPr lang="de-DE" sz="1100" strike="sngStrike" dirty="0" err="1"/>
+              <a:t>separaterly</a:t>
+            </a:r>
+            <a:r>
+              <a:rPr lang="de-DE" sz="1100" strike="sngStrike" dirty="0"/>
+              <a:t> </a:t>
+            </a:r>
+            <a:r>
+              <a:rPr lang="de-DE" sz="1100" strike="sngStrike" dirty="0" err="1"/>
+              <a:t>and</a:t>
+            </a:r>
+            <a:r>
+              <a:rPr lang="de-DE" sz="1100" strike="sngStrike" dirty="0"/>
+              <a:t> save (_</a:t>
+            </a:r>
+            <a:r>
+              <a:rPr lang="de-DE" sz="1100" strike="sngStrike" dirty="0" err="1"/>
+              <a:t>complete_preprocessing_A</a:t>
+            </a:r>
+            <a:r>
+              <a:rPr lang="de-DE" sz="1100" strike="sngStrike" dirty="0"/>
+              <a:t>/B);</a:t>
+            </a:r>
+          </a:p>
+          <a:p>
+            <a:r>
+              <a:rPr lang="de-DE" sz="1100" strike="sngStrike" dirty="0"/>
+              <a:t>Run </a:t>
+            </a:r>
+            <a:r>
+              <a:rPr lang="de-DE" sz="1100" strike="sngStrike" dirty="0" err="1"/>
+              <a:t>artifact</a:t>
+            </a:r>
+            <a:r>
+              <a:rPr lang="de-DE" sz="1100" strike="sngStrike" dirty="0"/>
+              <a:t> </a:t>
+            </a:r>
+            <a:r>
+              <a:rPr lang="de-DE" sz="1100" strike="sngStrike" dirty="0" err="1"/>
+              <a:t>rejection</a:t>
+            </a:r>
+            <a:r>
+              <a:rPr lang="de-DE" sz="1100" strike="sngStrike" dirty="0"/>
+              <a:t> </a:t>
+            </a:r>
+            <a:r>
+              <a:rPr lang="de-DE" sz="1100" strike="sngStrike" dirty="0" err="1"/>
+              <a:t>for</a:t>
+            </a:r>
+            <a:r>
+              <a:rPr lang="de-DE" sz="1100" strike="sngStrike" dirty="0"/>
+              <a:t> A </a:t>
+            </a:r>
+            <a:r>
+              <a:rPr lang="de-DE" sz="1100" strike="sngStrike" dirty="0" err="1"/>
+              <a:t>and</a:t>
+            </a:r>
+            <a:r>
+              <a:rPr lang="de-DE" sz="1100" strike="sngStrike" dirty="0"/>
+              <a:t> B </a:t>
+            </a:r>
+            <a:r>
+              <a:rPr lang="de-DE" sz="1100" strike="sngStrike" dirty="0" err="1"/>
+              <a:t>separately</a:t>
+            </a:r>
+            <a:r>
+              <a:rPr lang="de-DE" sz="1100" strike="sngStrike" dirty="0"/>
+              <a:t> </a:t>
+            </a:r>
+            <a:r>
+              <a:rPr lang="de-DE" sz="1100" strike="sngStrike" dirty="0" err="1"/>
+              <a:t>and</a:t>
+            </a:r>
+            <a:r>
+              <a:rPr lang="de-DE" sz="1100" strike="sngStrike" dirty="0"/>
+              <a:t> save (_</a:t>
+            </a:r>
+            <a:r>
+              <a:rPr lang="de-DE" sz="1100" strike="sngStrike" dirty="0" err="1"/>
+              <a:t>complete_preprocessing_withAR_A</a:t>
+            </a:r>
+            <a:r>
+              <a:rPr lang="de-DE" sz="1100" strike="sngStrike" dirty="0"/>
+              <a:t>/B)</a:t>
+            </a:r>
+          </a:p>
+        </p:txBody>
+      </p:sp>
+      <p:sp>
+        <p:nvSpPr>
+          <p:cNvPr id="2" name="Textfeld 1">
+            <a:extLst>
+              <a:ext uri="{FF2B5EF4-FFF2-40B4-BE49-F238E27FC236}">
+                <a16:creationId xmlns:a16="http://schemas.microsoft.com/office/drawing/2014/main" id="{DBC3EF3E-B569-0894-C3F6-F4AE5DFD93AC}"/>
+              </a:ext>
+            </a:extLst>
+          </p:cNvPr>
+          <p:cNvSpPr txBox="1"/>
+          <p:nvPr/>
+        </p:nvSpPr>
+        <p:spPr>
+          <a:xfrm>
+            <a:off x="1852607" y="161925"/>
+            <a:ext cx="1466853" cy="369332"/>
+          </a:xfrm>
+          <a:prstGeom prst="rect">
+            <a:avLst/>
+          </a:prstGeom>
+          <a:noFill/>
+        </p:spPr>
+        <p:txBody>
+          <a:bodyPr wrap="square" rtlCol="0">
+            <a:spAutoFit/>
+          </a:bodyPr>
+          <a:lstStyle/>
+          <a:p>
+            <a:r>
+              <a:rPr lang="de-DE" b="1" dirty="0"/>
+              <a:t>UPDATED</a:t>
+            </a:r>
+          </a:p>
+        </p:txBody>
+      </p:sp>
+      <p:sp>
+        <p:nvSpPr>
+          <p:cNvPr id="16" name="Textfeld 15">
+            <a:extLst>
+              <a:ext uri="{FF2B5EF4-FFF2-40B4-BE49-F238E27FC236}">
+                <a16:creationId xmlns:a16="http://schemas.microsoft.com/office/drawing/2014/main" id="{E17DB126-5887-3AF7-81E4-3E26F6A69CC2}"/>
+              </a:ext>
+            </a:extLst>
+          </p:cNvPr>
+          <p:cNvSpPr txBox="1"/>
+          <p:nvPr/>
+        </p:nvSpPr>
+        <p:spPr>
+          <a:xfrm>
+            <a:off x="1864519" y="5556171"/>
+            <a:ext cx="3148012" cy="1615827"/>
+          </a:xfrm>
+          <a:prstGeom prst="rect">
+            <a:avLst/>
+          </a:prstGeom>
+          <a:noFill/>
+        </p:spPr>
+        <p:style>
+          <a:lnRef idx="2">
+            <a:schemeClr val="dk1"/>
+          </a:lnRef>
+          <a:fillRef idx="1">
+            <a:schemeClr val="lt1"/>
+          </a:fillRef>
+          <a:effectRef idx="0">
+            <a:schemeClr val="dk1"/>
+          </a:effectRef>
+          <a:fontRef idx="minor">
+            <a:schemeClr val="dk1"/>
+          </a:fontRef>
+        </p:style>
+        <p:txBody>
+          <a:bodyPr wrap="square" rtlCol="0">
+            <a:spAutoFit/>
+          </a:bodyPr>
+          <a:lstStyle/>
+          <a:p>
+            <a:r>
+              <a:rPr lang="en-US" sz="1100" b="1" i="1" dirty="0" err="1"/>
+              <a:t>merge_eeg_and_tracking_data.m</a:t>
+            </a:r>
+            <a:endParaRPr lang="en-US" sz="1100" b="1" i="1" dirty="0"/>
+          </a:p>
+          <a:p>
+            <a:r>
+              <a:rPr lang="de-DE" sz="1100" dirty="0"/>
+              <a:t>Read in </a:t>
+            </a:r>
+            <a:r>
+              <a:rPr lang="de-DE" sz="1100" dirty="0" err="1"/>
+              <a:t>tracking</a:t>
+            </a:r>
+            <a:r>
+              <a:rPr lang="de-DE" sz="1100" dirty="0"/>
+              <a:t> </a:t>
+            </a:r>
+            <a:r>
+              <a:rPr lang="de-DE" sz="1100" dirty="0" err="1"/>
+              <a:t>data</a:t>
+            </a:r>
+            <a:r>
+              <a:rPr lang="de-DE" sz="1100" dirty="0"/>
+              <a:t>, </a:t>
+            </a:r>
+            <a:r>
+              <a:rPr lang="de-DE" sz="1100" dirty="0" err="1"/>
+              <a:t>upsample</a:t>
+            </a:r>
+            <a:r>
+              <a:rPr lang="de-DE" sz="1100" dirty="0"/>
+              <a:t> </a:t>
+            </a:r>
+            <a:r>
+              <a:rPr lang="de-DE" sz="1100" dirty="0" err="1"/>
+              <a:t>tracking</a:t>
+            </a:r>
+            <a:r>
+              <a:rPr lang="de-DE" sz="1100" dirty="0"/>
+              <a:t> </a:t>
+            </a:r>
+            <a:r>
+              <a:rPr lang="de-DE" sz="1100" dirty="0" err="1"/>
+              <a:t>data</a:t>
+            </a:r>
+            <a:r>
+              <a:rPr lang="de-DE" sz="1100" dirty="0"/>
+              <a:t>, </a:t>
+            </a:r>
+            <a:r>
+              <a:rPr lang="de-DE" sz="1100" dirty="0" err="1"/>
+              <a:t>delete</a:t>
+            </a:r>
+            <a:r>
+              <a:rPr lang="de-DE" sz="1100" dirty="0"/>
+              <a:t> all </a:t>
+            </a:r>
+            <a:r>
+              <a:rPr lang="de-DE" sz="1100" dirty="0" err="1"/>
+              <a:t>events</a:t>
+            </a:r>
+            <a:r>
+              <a:rPr lang="de-DE" sz="1100" dirty="0"/>
+              <a:t> </a:t>
+            </a:r>
+            <a:r>
+              <a:rPr lang="de-DE" sz="1100" dirty="0" err="1"/>
+              <a:t>before</a:t>
+            </a:r>
+            <a:r>
+              <a:rPr lang="de-DE" sz="1100" dirty="0"/>
+              <a:t> </a:t>
+            </a:r>
+            <a:r>
+              <a:rPr lang="de-DE" sz="1100" dirty="0" err="1"/>
+              <a:t>practice</a:t>
+            </a:r>
+            <a:r>
+              <a:rPr lang="de-DE" sz="1100" dirty="0"/>
+              <a:t>, </a:t>
+            </a:r>
+            <a:r>
+              <a:rPr lang="de-DE" sz="1100" dirty="0" err="1"/>
+              <a:t>insert</a:t>
+            </a:r>
+            <a:r>
+              <a:rPr lang="de-DE" sz="1100" dirty="0"/>
+              <a:t> </a:t>
+            </a:r>
+            <a:r>
+              <a:rPr lang="de-DE" sz="1100" dirty="0" err="1"/>
+              <a:t>end_trial</a:t>
+            </a:r>
+            <a:r>
+              <a:rPr lang="de-DE" sz="1100" dirty="0"/>
+              <a:t> </a:t>
+            </a:r>
+            <a:r>
+              <a:rPr lang="de-DE" sz="1100" dirty="0" err="1"/>
+              <a:t>triggers</a:t>
+            </a:r>
+            <a:r>
+              <a:rPr lang="de-DE" sz="1100" dirty="0"/>
+              <a:t>, </a:t>
+            </a:r>
+            <a:r>
+              <a:rPr lang="de-DE" sz="1100" dirty="0" err="1"/>
+              <a:t>insert</a:t>
+            </a:r>
+            <a:r>
+              <a:rPr lang="de-DE" sz="1100" dirty="0"/>
+              <a:t> </a:t>
+            </a:r>
+            <a:r>
+              <a:rPr lang="de-DE" sz="1100" dirty="0" err="1"/>
+              <a:t>triggers</a:t>
+            </a:r>
+            <a:r>
+              <a:rPr lang="de-DE" sz="1100" dirty="0"/>
+              <a:t> at </a:t>
+            </a:r>
+            <a:r>
+              <a:rPr lang="de-DE" sz="1100" dirty="0" err="1"/>
+              <a:t>every</a:t>
+            </a:r>
+            <a:r>
+              <a:rPr lang="de-DE" sz="1100" dirty="0"/>
+              <a:t> </a:t>
+            </a:r>
+            <a:r>
+              <a:rPr lang="de-DE" sz="1100" dirty="0" err="1"/>
+              <a:t>peak</a:t>
+            </a:r>
+            <a:r>
+              <a:rPr lang="de-DE" sz="1100" dirty="0"/>
+              <a:t>, </a:t>
+            </a:r>
+            <a:r>
+              <a:rPr lang="de-DE" sz="1100" dirty="0" err="1"/>
+              <a:t>calculate</a:t>
+            </a:r>
+            <a:r>
+              <a:rPr lang="de-DE" sz="1100" dirty="0"/>
+              <a:t> </a:t>
+            </a:r>
+            <a:r>
+              <a:rPr lang="de-DE" sz="1100" dirty="0" err="1"/>
+              <a:t>error</a:t>
+            </a:r>
+            <a:r>
+              <a:rPr lang="de-DE" sz="1100" dirty="0"/>
+              <a:t> in </a:t>
+            </a:r>
+            <a:r>
+              <a:rPr lang="de-DE" sz="1100" dirty="0" err="1"/>
+              <a:t>upsampled</a:t>
+            </a:r>
+            <a:r>
+              <a:rPr lang="de-DE" sz="1100" dirty="0"/>
+              <a:t> </a:t>
+            </a:r>
+            <a:r>
+              <a:rPr lang="de-DE" sz="1100" dirty="0" err="1"/>
+              <a:t>data</a:t>
+            </a:r>
+            <a:r>
+              <a:rPr lang="de-DE" sz="1100" dirty="0"/>
+              <a:t> (</a:t>
+            </a:r>
+            <a:r>
+              <a:rPr lang="de-DE" sz="1100" dirty="0" err="1"/>
+              <a:t>traj</a:t>
+            </a:r>
+            <a:r>
+              <a:rPr lang="de-DE" sz="1100" dirty="0"/>
+              <a:t> – </a:t>
+            </a:r>
+            <a:r>
+              <a:rPr lang="de-DE" sz="1100" dirty="0" err="1"/>
+              <a:t>purs</a:t>
+            </a:r>
+            <a:r>
+              <a:rPr lang="de-DE" sz="1100" dirty="0"/>
+              <a:t>), </a:t>
+            </a:r>
+            <a:r>
+              <a:rPr lang="de-DE" sz="1100" dirty="0" err="1"/>
+              <a:t>exclude</a:t>
+            </a:r>
+            <a:r>
+              <a:rPr lang="de-DE" sz="1100" dirty="0"/>
+              <a:t> </a:t>
+            </a:r>
+            <a:r>
+              <a:rPr lang="de-DE" sz="1100" dirty="0" err="1"/>
+              <a:t>trials</a:t>
+            </a:r>
+            <a:r>
+              <a:rPr lang="de-DE" sz="1100" dirty="0"/>
+              <a:t> </a:t>
+            </a:r>
+            <a:r>
+              <a:rPr lang="de-DE" sz="1100" dirty="0" err="1"/>
+              <a:t>that</a:t>
+            </a:r>
+            <a:r>
+              <a:rPr lang="de-DE" sz="1100" dirty="0"/>
+              <a:t> </a:t>
+            </a:r>
+            <a:r>
+              <a:rPr lang="de-DE" sz="1100" dirty="0" err="1"/>
+              <a:t>have</a:t>
+            </a:r>
+            <a:r>
+              <a:rPr lang="de-DE" sz="1100" dirty="0"/>
+              <a:t> </a:t>
+            </a:r>
+            <a:r>
+              <a:rPr lang="de-DE" sz="1100" dirty="0" err="1"/>
+              <a:t>artifactual</a:t>
+            </a:r>
+            <a:r>
+              <a:rPr lang="de-DE" sz="1100" dirty="0"/>
+              <a:t> behavioral </a:t>
+            </a:r>
+            <a:r>
+              <a:rPr lang="de-DE" sz="1100" dirty="0" err="1"/>
+              <a:t>data</a:t>
+            </a:r>
+            <a:r>
+              <a:rPr lang="de-DE" sz="1100" dirty="0"/>
+              <a:t>, </a:t>
+            </a:r>
+            <a:r>
+              <a:rPr lang="de-DE" sz="1100" dirty="0" err="1"/>
+              <a:t>create</a:t>
+            </a:r>
+            <a:r>
+              <a:rPr lang="de-DE" sz="1100" dirty="0"/>
+              <a:t> </a:t>
+            </a:r>
+            <a:r>
+              <a:rPr lang="de-DE" sz="1100" dirty="0" err="1"/>
+              <a:t>event</a:t>
+            </a:r>
+            <a:r>
+              <a:rPr lang="de-DE" sz="1100" dirty="0"/>
+              <a:t> </a:t>
+            </a:r>
+            <a:r>
+              <a:rPr lang="de-DE" sz="1100" dirty="0" err="1"/>
+              <a:t>fields</a:t>
+            </a:r>
+            <a:r>
+              <a:rPr lang="de-DE" sz="1100" dirty="0"/>
+              <a:t> </a:t>
+            </a:r>
+            <a:r>
+              <a:rPr lang="de-DE" sz="1100" dirty="0" err="1"/>
+              <a:t>for</a:t>
+            </a:r>
+            <a:r>
+              <a:rPr lang="de-DE" sz="1100" dirty="0"/>
+              <a:t>: </a:t>
+            </a:r>
+            <a:r>
+              <a:rPr lang="de-DE" sz="1100" dirty="0" err="1"/>
+              <a:t>trial</a:t>
+            </a:r>
+            <a:r>
+              <a:rPr lang="de-DE" sz="1100" dirty="0"/>
+              <a:t> </a:t>
+            </a:r>
+            <a:r>
+              <a:rPr lang="de-DE" sz="1100" dirty="0" err="1"/>
+              <a:t>latency</a:t>
+            </a:r>
+            <a:r>
+              <a:rPr lang="de-DE" sz="1100" dirty="0"/>
+              <a:t>, </a:t>
+            </a:r>
+            <a:r>
+              <a:rPr lang="de-DE" sz="1100" dirty="0" err="1"/>
+              <a:t>trial</a:t>
+            </a:r>
+            <a:r>
+              <a:rPr lang="de-DE" sz="1100" dirty="0"/>
+              <a:t> </a:t>
+            </a:r>
+            <a:r>
+              <a:rPr lang="de-DE" sz="1100" dirty="0" err="1"/>
+              <a:t>number</a:t>
+            </a:r>
+            <a:r>
+              <a:rPr lang="de-DE" sz="1100" dirty="0"/>
+              <a:t>, </a:t>
+            </a:r>
+            <a:r>
+              <a:rPr lang="de-DE" sz="1100" dirty="0" err="1"/>
+              <a:t>trial</a:t>
+            </a:r>
+            <a:r>
+              <a:rPr lang="de-DE" sz="1100" dirty="0"/>
+              <a:t> </a:t>
+            </a:r>
+            <a:r>
+              <a:rPr lang="de-DE" sz="1100" dirty="0" err="1"/>
+              <a:t>latency</a:t>
+            </a:r>
+            <a:r>
+              <a:rPr lang="de-DE" sz="1100" dirty="0"/>
+              <a:t> in </a:t>
+            </a:r>
+            <a:r>
+              <a:rPr lang="de-DE" sz="1100" dirty="0" err="1"/>
+              <a:t>ms</a:t>
+            </a:r>
+            <a:r>
+              <a:rPr lang="de-DE" sz="1100" dirty="0"/>
+              <a:t>, </a:t>
+            </a:r>
+            <a:r>
+              <a:rPr lang="de-DE" sz="1100" dirty="0" err="1"/>
+              <a:t>bad</a:t>
+            </a:r>
+            <a:r>
+              <a:rPr lang="de-DE" sz="1100" dirty="0"/>
+              <a:t> </a:t>
+            </a:r>
+            <a:r>
+              <a:rPr lang="de-DE" sz="1100" dirty="0" err="1"/>
+              <a:t>trials</a:t>
+            </a:r>
+            <a:r>
+              <a:rPr lang="de-DE" sz="1100" dirty="0"/>
+              <a:t>, </a:t>
+            </a:r>
+            <a:r>
+              <a:rPr lang="de-DE" sz="1100" dirty="0" err="1"/>
+              <a:t>task</a:t>
+            </a:r>
+            <a:r>
+              <a:rPr lang="de-DE" sz="1100" dirty="0"/>
+              <a:t>. Save </a:t>
+            </a:r>
+            <a:r>
+              <a:rPr lang="de-DE" sz="1100" dirty="0" err="1"/>
+              <a:t>updated</a:t>
+            </a:r>
+            <a:r>
+              <a:rPr lang="de-DE" sz="1100" dirty="0"/>
+              <a:t> </a:t>
+            </a:r>
+            <a:r>
+              <a:rPr lang="de-DE" sz="1100" dirty="0" err="1"/>
+              <a:t>structures</a:t>
+            </a:r>
+            <a:r>
+              <a:rPr lang="de-DE" sz="1100" dirty="0"/>
+              <a:t> </a:t>
+            </a:r>
+            <a:r>
+              <a:rPr lang="de-DE" sz="1100" dirty="0" err="1"/>
+              <a:t>as</a:t>
+            </a:r>
+            <a:r>
+              <a:rPr lang="de-DE" sz="1100" dirty="0"/>
+              <a:t> .</a:t>
+            </a:r>
+            <a:r>
+              <a:rPr lang="de-DE" sz="1100" dirty="0" err="1"/>
+              <a:t>set</a:t>
+            </a:r>
+            <a:r>
+              <a:rPr lang="de-DE" sz="1100" dirty="0"/>
+              <a:t> resp. </a:t>
+            </a:r>
+            <a:r>
+              <a:rPr lang="de-DE" sz="1100" dirty="0" err="1"/>
+              <a:t>one</a:t>
+            </a:r>
+            <a:r>
+              <a:rPr lang="de-DE" sz="1100" dirty="0"/>
+              <a:t> .</a:t>
+            </a:r>
+            <a:r>
+              <a:rPr lang="de-DE" sz="1100" dirty="0" err="1"/>
+              <a:t>mat</a:t>
+            </a:r>
+            <a:r>
+              <a:rPr lang="de-DE" sz="1100" dirty="0"/>
+              <a:t> </a:t>
+            </a:r>
+            <a:r>
+              <a:rPr lang="de-DE" sz="1100" dirty="0" err="1"/>
+              <a:t>file</a:t>
+            </a:r>
+            <a:r>
+              <a:rPr lang="de-DE" sz="1100" dirty="0"/>
+              <a:t> </a:t>
+            </a:r>
+            <a:r>
+              <a:rPr lang="de-DE" sz="1100" dirty="0" err="1"/>
+              <a:t>containing</a:t>
+            </a:r>
+            <a:r>
+              <a:rPr lang="de-DE" sz="1100" dirty="0"/>
+              <a:t> </a:t>
+            </a:r>
+            <a:r>
+              <a:rPr lang="de-DE" sz="1100" dirty="0" err="1"/>
+              <a:t>tracking</a:t>
+            </a:r>
+            <a:r>
+              <a:rPr lang="de-DE" sz="1100" dirty="0"/>
+              <a:t> </a:t>
+            </a:r>
+            <a:r>
+              <a:rPr lang="de-DE" sz="1100" dirty="0" err="1"/>
+              <a:t>data</a:t>
+            </a:r>
+            <a:r>
+              <a:rPr lang="de-DE" sz="1100" dirty="0"/>
+              <a:t>. </a:t>
+            </a:r>
+          </a:p>
+        </p:txBody>
+      </p:sp>
+      <p:sp>
+        <p:nvSpPr>
+          <p:cNvPr id="17" name="Textfeld 16">
+            <a:extLst>
+              <a:ext uri="{FF2B5EF4-FFF2-40B4-BE49-F238E27FC236}">
+                <a16:creationId xmlns:a16="http://schemas.microsoft.com/office/drawing/2014/main" id="{080698A1-7520-D1E7-8D74-44AE25DBD027}"/>
+              </a:ext>
+            </a:extLst>
+          </p:cNvPr>
+          <p:cNvSpPr txBox="1"/>
+          <p:nvPr/>
+        </p:nvSpPr>
+        <p:spPr>
+          <a:xfrm>
+            <a:off x="1864519" y="7359039"/>
+            <a:ext cx="3148012" cy="1277273"/>
+          </a:xfrm>
+          <a:prstGeom prst="rect">
+            <a:avLst/>
+          </a:prstGeom>
+          <a:noFill/>
+        </p:spPr>
+        <p:style>
+          <a:lnRef idx="2">
+            <a:schemeClr val="dk1"/>
+          </a:lnRef>
+          <a:fillRef idx="1">
+            <a:schemeClr val="lt1"/>
+          </a:fillRef>
+          <a:effectRef idx="0">
+            <a:schemeClr val="dk1"/>
+          </a:effectRef>
+          <a:fontRef idx="minor">
+            <a:schemeClr val="dk1"/>
+          </a:fontRef>
+        </p:style>
+        <p:txBody>
+          <a:bodyPr wrap="square" rtlCol="0">
+            <a:spAutoFit/>
+          </a:bodyPr>
+          <a:lstStyle/>
+          <a:p>
+            <a:r>
+              <a:rPr lang="en-US" sz="1100" b="1" i="1" dirty="0" err="1"/>
+              <a:t>epoching.m</a:t>
+            </a:r>
+            <a:endParaRPr lang="en-US" sz="1100" b="1" i="1" dirty="0"/>
+          </a:p>
+          <a:p>
+            <a:r>
+              <a:rPr lang="de-DE" sz="1100" dirty="0"/>
+              <a:t>Create </a:t>
+            </a:r>
+            <a:r>
+              <a:rPr lang="de-DE" sz="1100" dirty="0" err="1"/>
+              <a:t>epochs</a:t>
+            </a:r>
+            <a:r>
+              <a:rPr lang="de-DE" sz="1100" dirty="0"/>
+              <a:t> A and B </a:t>
+            </a:r>
+            <a:r>
+              <a:rPr lang="de-DE" sz="1100" dirty="0" err="1"/>
+              <a:t>events</a:t>
+            </a:r>
+            <a:r>
+              <a:rPr lang="de-DE" sz="1100" dirty="0"/>
+              <a:t>, save </a:t>
+            </a:r>
+            <a:r>
+              <a:rPr lang="de-DE" sz="1100" dirty="0" err="1"/>
+              <a:t>epoched</a:t>
+            </a:r>
+            <a:r>
+              <a:rPr lang="de-DE" sz="1100" dirty="0"/>
+              <a:t> </a:t>
+            </a:r>
+            <a:r>
+              <a:rPr lang="de-DE" sz="1100" dirty="0" err="1"/>
+              <a:t>data</a:t>
+            </a:r>
+            <a:r>
+              <a:rPr lang="de-DE" sz="1100" dirty="0"/>
+              <a:t> (_</a:t>
+            </a:r>
+            <a:r>
+              <a:rPr lang="de-DE" sz="1100" dirty="0" err="1"/>
+              <a:t>icaclean_epoched_A</a:t>
+            </a:r>
+            <a:r>
+              <a:rPr lang="de-DE" sz="1100" dirty="0"/>
+              <a:t>/B);</a:t>
+            </a:r>
+          </a:p>
+          <a:p>
+            <a:r>
+              <a:rPr lang="de-DE" sz="1100" dirty="0"/>
+              <a:t>Remove </a:t>
+            </a:r>
+            <a:r>
+              <a:rPr lang="de-DE" sz="1100" dirty="0" err="1"/>
+              <a:t>baseline</a:t>
+            </a:r>
+            <a:r>
+              <a:rPr lang="de-DE" sz="1100" dirty="0"/>
+              <a:t> </a:t>
+            </a:r>
+            <a:r>
+              <a:rPr lang="de-DE" sz="1100" dirty="0" err="1"/>
+              <a:t>for</a:t>
+            </a:r>
+            <a:r>
+              <a:rPr lang="de-DE" sz="1100" dirty="0"/>
+              <a:t> A and B </a:t>
+            </a:r>
+            <a:r>
+              <a:rPr lang="de-DE" sz="1100" dirty="0" err="1"/>
+              <a:t>separaterly</a:t>
+            </a:r>
+            <a:r>
+              <a:rPr lang="de-DE" sz="1100" dirty="0"/>
+              <a:t> and save (_</a:t>
+            </a:r>
+            <a:r>
+              <a:rPr lang="de-DE" sz="1100" dirty="0" err="1"/>
+              <a:t>complete_preprocessing_A</a:t>
+            </a:r>
+            <a:r>
+              <a:rPr lang="de-DE" sz="1100" dirty="0"/>
+              <a:t>/B);</a:t>
+            </a:r>
+          </a:p>
+          <a:p>
+            <a:r>
+              <a:rPr lang="de-DE" sz="1100" dirty="0"/>
+              <a:t>Run </a:t>
+            </a:r>
+            <a:r>
+              <a:rPr lang="de-DE" sz="1100" dirty="0" err="1"/>
+              <a:t>artifact</a:t>
+            </a:r>
+            <a:r>
+              <a:rPr lang="de-DE" sz="1100" dirty="0"/>
+              <a:t> </a:t>
+            </a:r>
+            <a:r>
+              <a:rPr lang="de-DE" sz="1100" dirty="0" err="1"/>
+              <a:t>rejection</a:t>
+            </a:r>
+            <a:r>
+              <a:rPr lang="de-DE" sz="1100" dirty="0"/>
+              <a:t> </a:t>
+            </a:r>
+            <a:r>
+              <a:rPr lang="de-DE" sz="1100" dirty="0" err="1"/>
+              <a:t>for</a:t>
+            </a:r>
+            <a:r>
+              <a:rPr lang="de-DE" sz="1100" dirty="0"/>
+              <a:t> A and B </a:t>
+            </a:r>
+            <a:r>
+              <a:rPr lang="de-DE" sz="1100" dirty="0" err="1"/>
+              <a:t>separately</a:t>
+            </a:r>
+            <a:r>
+              <a:rPr lang="de-DE" sz="1100" dirty="0"/>
+              <a:t> and save (_</a:t>
+            </a:r>
+            <a:r>
+              <a:rPr lang="de-DE" sz="1100" dirty="0" err="1"/>
+              <a:t>complete_preprocessing_withAR_A</a:t>
+            </a:r>
+            <a:r>
+              <a:rPr lang="de-DE" sz="1100" dirty="0"/>
+              <a:t>/B)</a:t>
+            </a:r>
+          </a:p>
+        </p:txBody>
+      </p:sp>
+    </p:spTree>
+    <p:extLst>
+      <p:ext uri="{BB962C8B-B14F-4D97-AF65-F5344CB8AC3E}">
+        <p14:creationId xmlns:p14="http://schemas.microsoft.com/office/powerpoint/2010/main" val="629789642"/>
+      </p:ext>
+    </p:extLst>
+  </p:cSld>
+  <p:clrMapOvr>
+    <a:masterClrMapping/>
+  </p:clrMapOvr>
+  <p:extLst>
+    <p:ext uri="{6950BFC3-D8DA-4A85-94F7-54DA5524770B}">
+      <p188:commentRel xmlns:p188="http://schemas.microsoft.com/office/powerpoint/2018/8/main" r:id="rId2"/>
+    </p:ext>
+  </p:extLst>
 </p:sld>
 </file>
 

</xml_diff>